<commit_message>
PPT - Smart Parking
Apresentação - 2 Sprint (Versão 2)
</commit_message>
<xml_diff>
--- a/Apresentação TechParking.pptx
+++ b/Apresentação TechParking.pptx
@@ -5,7 +5,7 @@
     <p:sldMasterId id="2147483659" r:id="rId1"/>
   </p:sldMasterIdLst>
   <p:notesMasterIdLst>
-    <p:notesMasterId r:id="rId17"/>
+    <p:notesMasterId r:id="rId20"/>
   </p:notesMasterIdLst>
   <p:sldIdLst>
     <p:sldId id="258" r:id="rId2"/>
@@ -13,16 +13,19 @@
     <p:sldId id="285" r:id="rId4"/>
     <p:sldId id="287" r:id="rId5"/>
     <p:sldId id="286" r:id="rId6"/>
-    <p:sldId id="260" r:id="rId7"/>
-    <p:sldId id="288" r:id="rId8"/>
-    <p:sldId id="295" r:id="rId9"/>
-    <p:sldId id="291" r:id="rId10"/>
-    <p:sldId id="294" r:id="rId11"/>
-    <p:sldId id="265" r:id="rId12"/>
-    <p:sldId id="269" r:id="rId13"/>
-    <p:sldId id="297" r:id="rId14"/>
-    <p:sldId id="298" r:id="rId15"/>
-    <p:sldId id="299" r:id="rId16"/>
+    <p:sldId id="301" r:id="rId7"/>
+    <p:sldId id="260" r:id="rId8"/>
+    <p:sldId id="288" r:id="rId9"/>
+    <p:sldId id="295" r:id="rId10"/>
+    <p:sldId id="291" r:id="rId11"/>
+    <p:sldId id="294" r:id="rId12"/>
+    <p:sldId id="265" r:id="rId13"/>
+    <p:sldId id="303" r:id="rId14"/>
+    <p:sldId id="269" r:id="rId15"/>
+    <p:sldId id="297" r:id="rId16"/>
+    <p:sldId id="298" r:id="rId17"/>
+    <p:sldId id="299" r:id="rId18"/>
+    <p:sldId id="300" r:id="rId19"/>
   </p:sldIdLst>
   <p:sldSz cx="9144000" cy="5143500" type="screen16x9"/>
   <p:notesSz cx="6858000" cy="9144000"/>
@@ -279,10 +282,11 @@
   <c:chart>
     <c:autoTitleDeleted val="1"/>
     <c:view3D>
-      <c:rotX val="30"/>
+      <c:rotX val="50"/>
       <c:rotY val="0"/>
       <c:depthPercent val="100"/>
       <c:rAngAx val="0"/>
+      <c:perspective val="60"/>
     </c:view3D>
     <c:floor>
       <c:thickness val="0"/>
@@ -318,7 +322,17 @@
       </c:spPr>
     </c:backWall>
     <c:plotArea>
-      <c:layout/>
+      <c:layout>
+        <c:manualLayout>
+          <c:layoutTarget val="inner"/>
+          <c:xMode val="edge"/>
+          <c:yMode val="edge"/>
+          <c:x val="3.0089063196294199E-2"/>
+          <c:y val="5.2698771883476235E-2"/>
+          <c:w val="0.93982187360741165"/>
+          <c:h val="0.79255840780550424"/>
+        </c:manualLayout>
+      </c:layout>
       <c:pie3DChart>
         <c:varyColors val="1"/>
         <c:ser>
@@ -330,7 +344,7 @@
               <c:strCache>
                 <c:ptCount val="1"/>
                 <c:pt idx="0">
-                  <c:v>Frota de veículos</c:v>
+                  <c:v>Vendas</c:v>
                 </c:pt>
               </c:strCache>
             </c:strRef>
@@ -342,17 +356,21 @@
               <a:solidFill>
                 <a:schemeClr val="accent1"/>
               </a:solidFill>
-              <a:ln w="25400">
-                <a:solidFill>
-                  <a:schemeClr val="lt1"/>
-                </a:solidFill>
+              <a:ln>
+                <a:noFill/>
               </a:ln>
-              <a:effectLst/>
-              <a:sp3d contourW="25400">
-                <a:contourClr>
-                  <a:schemeClr val="lt1"/>
-                </a:contourClr>
-              </a:sp3d>
+              <a:effectLst>
+                <a:outerShdw blurRad="88900" sx="102000" sy="102000" algn="ctr" rotWithShape="0">
+                  <a:prstClr val="black">
+                    <a:alpha val="20000"/>
+                  </a:prstClr>
+                </a:outerShdw>
+              </a:effectLst>
+              <a:scene3d>
+                <a:camera prst="orthographicFront"/>
+                <a:lightRig rig="threePt" dir="t"/>
+              </a:scene3d>
+              <a:sp3d prstMaterial="matte"/>
             </c:spPr>
           </c:dPt>
           <c:dPt>
@@ -362,17 +380,21 @@
               <a:solidFill>
                 <a:schemeClr val="accent2"/>
               </a:solidFill>
-              <a:ln w="25400">
-                <a:solidFill>
-                  <a:schemeClr val="lt1"/>
-                </a:solidFill>
+              <a:ln>
+                <a:noFill/>
               </a:ln>
-              <a:effectLst/>
-              <a:sp3d contourW="25400">
-                <a:contourClr>
-                  <a:schemeClr val="lt1"/>
-                </a:contourClr>
-              </a:sp3d>
+              <a:effectLst>
+                <a:outerShdw blurRad="88900" sx="102000" sy="102000" algn="ctr" rotWithShape="0">
+                  <a:prstClr val="black">
+                    <a:alpha val="20000"/>
+                  </a:prstClr>
+                </a:outerShdw>
+              </a:effectLst>
+              <a:scene3d>
+                <a:camera prst="orthographicFront"/>
+                <a:lightRig rig="threePt" dir="t"/>
+              </a:scene3d>
+              <a:sp3d prstMaterial="matte"/>
             </c:spPr>
           </c:dPt>
           <c:dPt>
@@ -382,17 +404,21 @@
               <a:solidFill>
                 <a:schemeClr val="accent3"/>
               </a:solidFill>
-              <a:ln w="25400">
-                <a:solidFill>
-                  <a:schemeClr val="lt1"/>
-                </a:solidFill>
+              <a:ln>
+                <a:noFill/>
               </a:ln>
-              <a:effectLst/>
-              <a:sp3d contourW="25400">
-                <a:contourClr>
-                  <a:schemeClr val="lt1"/>
-                </a:contourClr>
-              </a:sp3d>
+              <a:effectLst>
+                <a:outerShdw blurRad="88900" sx="102000" sy="102000" algn="ctr" rotWithShape="0">
+                  <a:prstClr val="black">
+                    <a:alpha val="20000"/>
+                  </a:prstClr>
+                </a:outerShdw>
+              </a:effectLst>
+              <a:scene3d>
+                <a:camera prst="orthographicFront"/>
+                <a:lightRig rig="threePt" dir="t"/>
+              </a:scene3d>
+              <a:sp3d prstMaterial="matte"/>
             </c:spPr>
           </c:dPt>
           <c:dPt>
@@ -402,32 +428,92 @@
               <a:solidFill>
                 <a:schemeClr val="accent4"/>
               </a:solidFill>
-              <a:ln w="25400">
-                <a:solidFill>
-                  <a:schemeClr val="lt1"/>
-                </a:solidFill>
+              <a:ln>
+                <a:noFill/>
+              </a:ln>
+              <a:effectLst>
+                <a:outerShdw blurRad="88900" sx="102000" sy="102000" algn="ctr" rotWithShape="0">
+                  <a:prstClr val="black">
+                    <a:alpha val="20000"/>
+                  </a:prstClr>
+                </a:outerShdw>
+              </a:effectLst>
+              <a:scene3d>
+                <a:camera prst="orthographicFront"/>
+                <a:lightRig rig="threePt" dir="t"/>
+              </a:scene3d>
+              <a:sp3d prstMaterial="matte"/>
+            </c:spPr>
+          </c:dPt>
+          <c:dLbls>
+            <c:spPr>
+              <a:noFill/>
+              <a:ln>
+                <a:noFill/>
               </a:ln>
               <a:effectLst/>
-              <a:sp3d contourW="25400">
-                <a:contourClr>
-                  <a:schemeClr val="lt1"/>
-                </a:contourClr>
-              </a:sp3d>
             </c:spPr>
-          </c:dPt>
+            <c:txPr>
+              <a:bodyPr rot="0" spcFirstLastPara="1" vertOverflow="ellipsis" vert="horz" wrap="square" lIns="38100" tIns="19050" rIns="38100" bIns="19050" anchor="ctr" anchorCtr="1">
+                <a:spAutoFit/>
+              </a:bodyPr>
+              <a:lstStyle/>
+              <a:p>
+                <a:pPr>
+                  <a:defRPr sz="1197" b="1" i="0" u="none" strike="noStrike" kern="1200" baseline="0">
+                    <a:solidFill>
+                      <a:schemeClr val="lt1"/>
+                    </a:solidFill>
+                    <a:latin typeface="+mn-lt"/>
+                    <a:ea typeface="+mn-ea"/>
+                    <a:cs typeface="+mn-cs"/>
+                  </a:defRPr>
+                </a:pPr>
+                <a:endParaRPr lang="pt-BR"/>
+              </a:p>
+            </c:txPr>
+            <c:dLblPos val="inEnd"/>
+            <c:showLegendKey val="0"/>
+            <c:showVal val="0"/>
+            <c:showCatName val="0"/>
+            <c:showSerName val="0"/>
+            <c:showPercent val="1"/>
+            <c:showBubbleSize val="0"/>
+            <c:showLeaderLines val="1"/>
+            <c:leaderLines>
+              <c:spPr>
+                <a:ln w="9525" cap="flat" cmpd="sng" algn="ctr">
+                  <a:solidFill>
+                    <a:schemeClr val="dk1">
+                      <a:lumMod val="35000"/>
+                      <a:lumOff val="65000"/>
+                    </a:schemeClr>
+                  </a:solidFill>
+                  <a:round/>
+                </a:ln>
+                <a:effectLst/>
+              </c:spPr>
+            </c:leaderLines>
+            <c:extLst>
+              <c:ext xmlns:c15="http://schemas.microsoft.com/office/drawing/2012/chart" uri="{CE6537A1-D6FC-4f65-9D91-7224C49458BB}"/>
+            </c:extLst>
+          </c:dLbls>
           <c:cat>
             <c:strRef>
               <c:f>Planilha1!$A$2:$A$5</c:f>
               <c:strCache>
-                <c:ptCount val="3"/>
+                <c:ptCount val="4"/>
                 <c:pt idx="0">
                   <c:v>São Paulo</c:v>
                 </c:pt>
                 <c:pt idx="1">
-                  <c:v>Minas  Gerais</c:v>
+                  <c:v>Minas Gerais</c:v>
                 </c:pt>
                 <c:pt idx="2">
                   <c:v>Paraná</c:v>
+                </c:pt>
+                <c:pt idx="3">
+                  <c:v>Outros Estados</c:v>
                 </c:pt>
               </c:strCache>
             </c:strRef>
@@ -436,32 +522,36 @@
             <c:numRef>
               <c:f>Planilha1!$B$2:$B$5</c:f>
               <c:numCache>
-                <c:formatCode>0.00%</c:formatCode>
+                <c:formatCode>General</c:formatCode>
                 <c:ptCount val="4"/>
                 <c:pt idx="0">
-                  <c:v>0.28760000000000002</c:v>
+                  <c:v>28.76</c:v>
                 </c:pt>
                 <c:pt idx="1">
-                  <c:v>0.12280000000000001</c:v>
+                  <c:v>12.28</c:v>
                 </c:pt>
                 <c:pt idx="2">
-                  <c:v>7.8299999999999995E-2</c:v>
+                  <c:v>7.83</c:v>
+                </c:pt>
+                <c:pt idx="3">
+                  <c:v>51.13</c:v>
                 </c:pt>
               </c:numCache>
             </c:numRef>
           </c:val>
           <c:extLst>
             <c:ext xmlns:c16="http://schemas.microsoft.com/office/drawing/2014/chart" uri="{C3380CC4-5D6E-409C-BE32-E72D297353CC}">
-              <c16:uniqueId val="{00000000-56A3-4642-8E18-97D7278CF6F5}"/>
+              <c16:uniqueId val="{00000000-B00A-4FF9-A7B7-8E1EC817EF6E}"/>
             </c:ext>
           </c:extLst>
         </c:ser>
         <c:dLbls>
+          <c:dLblPos val="inEnd"/>
           <c:showLegendKey val="0"/>
           <c:showVal val="0"/>
           <c:showCatName val="0"/>
           <c:showSerName val="0"/>
-          <c:showPercent val="0"/>
+          <c:showPercent val="1"/>
           <c:showBubbleSize val="0"/>
           <c:showLeaderLines val="1"/>
         </c:dLbls>
@@ -476,13 +566,13 @@
     </c:plotArea>
     <c:legend>
       <c:legendPos val="b"/>
-      <c:legendEntry>
-        <c:idx val="3"/>
-        <c:delete val="1"/>
-      </c:legendEntry>
       <c:overlay val="0"/>
       <c:spPr>
-        <a:noFill/>
+        <a:solidFill>
+          <a:schemeClr val="lt1">
+            <a:alpha val="78000"/>
+          </a:schemeClr>
+        </a:solidFill>
         <a:ln>
           <a:noFill/>
         </a:ln>
@@ -495,7 +585,7 @@
           <a:pPr>
             <a:defRPr sz="1197" b="0" i="0" u="none" strike="noStrike" kern="1200" baseline="0">
               <a:solidFill>
-                <a:schemeClr val="tx1">
+                <a:schemeClr val="dk1">
                   <a:lumMod val="65000"/>
                   <a:lumOff val="35000"/>
                 </a:schemeClr>
@@ -522,8 +612,9 @@
   </c:chart>
   <c:spPr>
     <a:noFill/>
-    <a:ln>
+    <a:ln w="9525" cap="flat" cmpd="sng" algn="ctr">
       <a:noFill/>
+      <a:round/>
     </a:ln>
     <a:effectLst/>
   </c:spPr>
@@ -584,56 +675,52 @@
 </file>
 
 <file path=ppt/charts/style1.xml><?xml version="1.0" encoding="utf-8"?>
-<cs:chartStyle xmlns:cs="http://schemas.microsoft.com/office/drawing/2012/chartStyle" xmlns:a="http://schemas.openxmlformats.org/drawingml/2006/main" id="262">
+<cs:chartStyle xmlns:cs="http://schemas.microsoft.com/office/drawing/2012/chartStyle" xmlns:a="http://schemas.openxmlformats.org/drawingml/2006/main" id="261">
   <cs:axisTitle>
     <cs:lnRef idx="0"/>
     <cs:fillRef idx="0"/>
     <cs:effectRef idx="0"/>
     <cs:fontRef idx="minor">
-      <a:schemeClr val="tx1">
+      <a:schemeClr val="dk1">
         <a:lumMod val="65000"/>
         <a:lumOff val="35000"/>
       </a:schemeClr>
     </cs:fontRef>
-    <cs:defRPr sz="1330" kern="1200"/>
+    <cs:defRPr sz="1197" kern="1200"/>
   </cs:axisTitle>
   <cs:categoryAxis>
     <cs:lnRef idx="0"/>
     <cs:fillRef idx="0"/>
     <cs:effectRef idx="0"/>
     <cs:fontRef idx="minor">
-      <a:schemeClr val="tx1">
+      <a:schemeClr val="dk1">
         <a:lumMod val="65000"/>
         <a:lumOff val="35000"/>
       </a:schemeClr>
     </cs:fontRef>
-    <cs:spPr>
-      <a:ln w="9525" cap="flat" cmpd="sng" algn="ctr">
-        <a:solidFill>
-          <a:schemeClr val="tx1">
-            <a:lumMod val="15000"/>
-            <a:lumOff val="85000"/>
-          </a:schemeClr>
-        </a:solidFill>
-        <a:round/>
-      </a:ln>
-    </cs:spPr>
     <cs:defRPr sz="1197" kern="1200"/>
   </cs:categoryAxis>
-  <cs:chartArea mods="allowNoFillOverride allowNoLineOverride">
+  <cs:chartArea>
     <cs:lnRef idx="0"/>
     <cs:fillRef idx="0"/>
     <cs:effectRef idx="0"/>
     <cs:fontRef idx="minor">
-      <a:schemeClr val="tx1"/>
+      <a:schemeClr val="dk1"/>
     </cs:fontRef>
     <cs:spPr>
-      <a:solidFill>
-        <a:schemeClr val="bg1"/>
-      </a:solidFill>
+      <a:pattFill prst="dkDnDiag">
+        <a:fgClr>
+          <a:schemeClr val="lt1">
+            <a:lumMod val="95000"/>
+          </a:schemeClr>
+        </a:fgClr>
+        <a:bgClr>
+          <a:schemeClr val="lt1"/>
+        </a:bgClr>
+      </a:pattFill>
       <a:ln w="9525" cap="flat" cmpd="sng" algn="ctr">
         <a:solidFill>
-          <a:schemeClr val="tx1">
+          <a:schemeClr val="dk1">
             <a:lumMod val="15000"/>
             <a:lumOff val="85000"/>
           </a:schemeClr>
@@ -648,12 +735,9 @@
     <cs:fillRef idx="0"/>
     <cs:effectRef idx="0"/>
     <cs:fontRef idx="minor">
-      <a:schemeClr val="tx1">
-        <a:lumMod val="75000"/>
-        <a:lumOff val="25000"/>
-      </a:schemeClr>
+      <a:schemeClr val="lt1"/>
     </cs:fontRef>
-    <cs:defRPr sz="1197" kern="1200"/>
+    <cs:defRPr sz="1197" b="1" i="0" u="none" strike="noStrike" kern="1200" baseline="0"/>
   </cs:dataLabel>
   <cs:dataLabelCallout>
     <cs:lnRef idx="0"/>
@@ -667,9 +751,11 @@
     </cs:fontRef>
     <cs:spPr>
       <a:solidFill>
-        <a:schemeClr val="lt1"/>
+        <a:schemeClr val="lt1">
+          <a:alpha val="75000"/>
+        </a:schemeClr>
       </a:solidFill>
-      <a:ln>
+      <a:ln w="9525">
         <a:solidFill>
           <a:schemeClr val="dk1">
             <a:lumMod val="25000"/>
@@ -685,36 +771,51 @@
   </cs:dataLabelCallout>
   <cs:dataPoint>
     <cs:lnRef idx="0"/>
-    <cs:fillRef idx="1">
+    <cs:fillRef idx="0">
       <cs:styleClr val="auto"/>
     </cs:fillRef>
     <cs:effectRef idx="0"/>
     <cs:fontRef idx="minor">
-      <a:schemeClr val="tx1"/>
+      <a:schemeClr val="dk1"/>
     </cs:fontRef>
     <cs:spPr>
-      <a:ln w="19050">
-        <a:solidFill>
-          <a:schemeClr val="lt1"/>
-        </a:solidFill>
-      </a:ln>
+      <a:solidFill>
+        <a:schemeClr val="phClr"/>
+      </a:solidFill>
+      <a:effectLst>
+        <a:outerShdw blurRad="317500" algn="ctr" rotWithShape="0">
+          <a:prstClr val="black">
+            <a:alpha val="25000"/>
+          </a:prstClr>
+        </a:outerShdw>
+      </a:effectLst>
     </cs:spPr>
   </cs:dataPoint>
   <cs:dataPoint3D>
     <cs:lnRef idx="0"/>
-    <cs:fillRef idx="1">
+    <cs:fillRef idx="0">
       <cs:styleClr val="auto"/>
     </cs:fillRef>
     <cs:effectRef idx="0"/>
     <cs:fontRef idx="minor">
-      <a:schemeClr val="tx1"/>
+      <a:schemeClr val="dk1"/>
     </cs:fontRef>
     <cs:spPr>
-      <a:ln w="25400">
-        <a:solidFill>
-          <a:schemeClr val="lt1"/>
-        </a:solidFill>
-      </a:ln>
+      <a:solidFill>
+        <a:schemeClr val="phClr"/>
+      </a:solidFill>
+      <a:effectLst>
+        <a:outerShdw blurRad="88900" sx="102000" sy="102000" algn="ctr" rotWithShape="0">
+          <a:prstClr val="black">
+            <a:alpha val="20000"/>
+          </a:prstClr>
+        </a:outerShdw>
+      </a:effectLst>
+      <a:scene3d>
+        <a:camera prst="orthographicFront"/>
+        <a:lightRig rig="threePt" dir="t"/>
+      </a:scene3d>
+      <a:sp3d prstMaterial="matte"/>
     </cs:spPr>
   </cs:dataPoint3D>
   <cs:dataPointLine>
@@ -724,7 +825,7 @@
     <cs:fillRef idx="0"/>
     <cs:effectRef idx="0"/>
     <cs:fontRef idx="minor">
-      <a:schemeClr val="tx1"/>
+      <a:schemeClr val="dk1"/>
     </cs:fontRef>
     <cs:spPr>
       <a:ln w="28575" cap="rnd">
@@ -736,25 +837,26 @@
     </cs:spPr>
   </cs:dataPointLine>
   <cs:dataPointMarker>
-    <cs:lnRef idx="0">
-      <cs:styleClr val="auto"/>
-    </cs:lnRef>
-    <cs:fillRef idx="1">
+    <cs:lnRef idx="0"/>
+    <cs:fillRef idx="0">
       <cs:styleClr val="auto"/>
     </cs:fillRef>
     <cs:effectRef idx="0"/>
     <cs:fontRef idx="minor">
-      <a:schemeClr val="tx1"/>
+      <a:schemeClr val="dk1"/>
     </cs:fontRef>
     <cs:spPr>
+      <a:solidFill>
+        <a:schemeClr val="phClr"/>
+      </a:solidFill>
       <a:ln w="9525">
         <a:solidFill>
-          <a:schemeClr val="phClr"/>
+          <a:schemeClr val="lt1"/>
         </a:solidFill>
       </a:ln>
     </cs:spPr>
   </cs:dataPointMarker>
-  <cs:dataPointMarkerLayout symbol="circle" size="5"/>
+  <cs:dataPointMarkerLayout symbol="circle" size="6"/>
   <cs:dataPointWireframe>
     <cs:lnRef idx="0">
       <cs:styleClr val="auto"/>
@@ -762,7 +864,7 @@
     <cs:fillRef idx="0"/>
     <cs:effectRef idx="0"/>
     <cs:fontRef idx="minor">
-      <a:schemeClr val="tx1"/>
+      <a:schemeClr val="dk1"/>
     </cs:fontRef>
     <cs:spPr>
       <a:ln w="9525" cap="rnd">
@@ -778,7 +880,7 @@
     <cs:fillRef idx="0"/>
     <cs:effectRef idx="0"/>
     <cs:fontRef idx="minor">
-      <a:schemeClr val="tx1">
+      <a:schemeClr val="dk1">
         <a:lumMod val="65000"/>
         <a:lumOff val="35000"/>
       </a:schemeClr>
@@ -787,7 +889,7 @@
       <a:noFill/>
       <a:ln w="9525" cap="flat" cmpd="sng" algn="ctr">
         <a:solidFill>
-          <a:schemeClr val="tx1">
+          <a:schemeClr val="dk1">
             <a:lumMod val="15000"/>
             <a:lumOff val="85000"/>
           </a:schemeClr>
@@ -802,7 +904,7 @@
     <cs:fillRef idx="0"/>
     <cs:effectRef idx="0"/>
     <cs:fontRef idx="minor">
-      <a:schemeClr val="tx1"/>
+      <a:schemeClr val="dk1"/>
     </cs:fontRef>
     <cs:spPr>
       <a:solidFill>
@@ -813,7 +915,7 @@
       </a:solidFill>
       <a:ln w="9525" cap="flat" cmpd="sng" algn="ctr">
         <a:solidFill>
-          <a:schemeClr val="tx1">
+          <a:schemeClr val="dk1">
             <a:lumMod val="65000"/>
             <a:lumOff val="35000"/>
           </a:schemeClr>
@@ -827,12 +929,12 @@
     <cs:fillRef idx="0"/>
     <cs:effectRef idx="0"/>
     <cs:fontRef idx="minor">
-      <a:schemeClr val="tx1"/>
+      <a:schemeClr val="dk1"/>
     </cs:fontRef>
     <cs:spPr>
       <a:ln w="9525" cap="flat" cmpd="sng" algn="ctr">
         <a:solidFill>
-          <a:schemeClr val="tx1">
+          <a:schemeClr val="dk1">
             <a:lumMod val="35000"/>
             <a:lumOff val="65000"/>
           </a:schemeClr>
@@ -846,12 +948,12 @@
     <cs:fillRef idx="0"/>
     <cs:effectRef idx="0"/>
     <cs:fontRef idx="minor">
-      <a:schemeClr val="tx1"/>
+      <a:schemeClr val="dk1"/>
     </cs:fontRef>
     <cs:spPr>
       <a:ln w="9525" cap="flat" cmpd="sng" algn="ctr">
         <a:solidFill>
-          <a:schemeClr val="tx1">
+          <a:schemeClr val="dk1">
             <a:lumMod val="65000"/>
             <a:lumOff val="35000"/>
           </a:schemeClr>
@@ -865,7 +967,7 @@
     <cs:fillRef idx="0"/>
     <cs:effectRef idx="0"/>
     <cs:fontRef idx="minor">
-      <a:schemeClr val="tx1"/>
+      <a:schemeClr val="dk1"/>
     </cs:fontRef>
     <cs:spPr>
       <a:noFill/>
@@ -879,12 +981,12 @@
     <cs:fillRef idx="0"/>
     <cs:effectRef idx="0"/>
     <cs:fontRef idx="minor">
-      <a:schemeClr val="tx1"/>
+      <a:schemeClr val="dk1"/>
     </cs:fontRef>
     <cs:spPr>
       <a:ln w="9525" cap="flat" cmpd="sng" algn="ctr">
         <a:solidFill>
-          <a:schemeClr val="tx1">
+          <a:schemeClr val="dk1">
             <a:lumMod val="15000"/>
             <a:lumOff val="85000"/>
           </a:schemeClr>
@@ -898,12 +1000,12 @@
     <cs:fillRef idx="0"/>
     <cs:effectRef idx="0"/>
     <cs:fontRef idx="minor">
-      <a:schemeClr val="tx1"/>
+      <a:schemeClr val="dk1"/>
     </cs:fontRef>
     <cs:spPr>
       <a:ln w="9525" cap="flat" cmpd="sng" algn="ctr">
         <a:solidFill>
-          <a:schemeClr val="tx1">
+          <a:schemeClr val="dk1">
             <a:lumMod val="5000"/>
             <a:lumOff val="95000"/>
           </a:schemeClr>
@@ -917,12 +1019,12 @@
     <cs:fillRef idx="0"/>
     <cs:effectRef idx="0"/>
     <cs:fontRef idx="minor">
-      <a:schemeClr val="tx1"/>
+      <a:schemeClr val="dk1"/>
     </cs:fontRef>
     <cs:spPr>
       <a:ln w="9525" cap="flat" cmpd="sng" algn="ctr">
         <a:solidFill>
-          <a:schemeClr val="tx1">
+          <a:schemeClr val="dk1">
             <a:lumMod val="50000"/>
             <a:lumOff val="50000"/>
           </a:schemeClr>
@@ -936,12 +1038,12 @@
     <cs:fillRef idx="0"/>
     <cs:effectRef idx="0"/>
     <cs:fontRef idx="minor">
-      <a:schemeClr val="tx1"/>
+      <a:schemeClr val="dk1"/>
     </cs:fontRef>
     <cs:spPr>
       <a:ln w="9525" cap="flat" cmpd="sng" algn="ctr">
         <a:solidFill>
-          <a:schemeClr val="tx1">
+          <a:schemeClr val="dk1">
             <a:lumMod val="35000"/>
             <a:lumOff val="65000"/>
           </a:schemeClr>
@@ -955,11 +1057,18 @@
     <cs:fillRef idx="0"/>
     <cs:effectRef idx="0"/>
     <cs:fontRef idx="minor">
-      <a:schemeClr val="tx1">
+      <a:schemeClr val="dk1">
         <a:lumMod val="65000"/>
         <a:lumOff val="35000"/>
       </a:schemeClr>
     </cs:fontRef>
+    <cs:spPr>
+      <a:solidFill>
+        <a:schemeClr val="lt1">
+          <a:alpha val="78000"/>
+        </a:schemeClr>
+      </a:solidFill>
+    </cs:spPr>
     <cs:defRPr sz="1197" kern="1200"/>
   </cs:legend>
   <cs:plotArea mods="allowNoFillOverride allowNoLineOverride">
@@ -967,7 +1076,7 @@
     <cs:fillRef idx="0"/>
     <cs:effectRef idx="0"/>
     <cs:fontRef idx="minor">
-      <a:schemeClr val="tx1"/>
+      <a:schemeClr val="dk1"/>
     </cs:fontRef>
   </cs:plotArea>
   <cs:plotArea3D mods="allowNoFillOverride allowNoLineOverride">
@@ -975,7 +1084,7 @@
     <cs:fillRef idx="0"/>
     <cs:effectRef idx="0"/>
     <cs:fontRef idx="minor">
-      <a:schemeClr val="tx1"/>
+      <a:schemeClr val="dk1"/>
     </cs:fontRef>
   </cs:plotArea3D>
   <cs:seriesAxis>
@@ -983,7 +1092,7 @@
     <cs:fillRef idx="0"/>
     <cs:effectRef idx="0"/>
     <cs:fontRef idx="minor">
-      <a:schemeClr val="tx1">
+      <a:schemeClr val="dk1">
         <a:lumMod val="65000"/>
         <a:lumOff val="35000"/>
       </a:schemeClr>
@@ -995,12 +1104,12 @@
     <cs:fillRef idx="0"/>
     <cs:effectRef idx="0"/>
     <cs:fontRef idx="minor">
-      <a:schemeClr val="tx1"/>
+      <a:schemeClr val="dk1"/>
     </cs:fontRef>
     <cs:spPr>
       <a:ln w="9525" cap="flat" cmpd="sng" algn="ctr">
         <a:solidFill>
-          <a:schemeClr val="tx1">
+          <a:schemeClr val="dk1">
             <a:lumMod val="35000"/>
             <a:lumOff val="65000"/>
           </a:schemeClr>
@@ -1014,12 +1123,12 @@
     <cs:fillRef idx="0"/>
     <cs:effectRef idx="0"/>
     <cs:fontRef idx="minor">
-      <a:schemeClr val="tx1">
+      <a:schemeClr val="dk1">
         <a:lumMod val="65000"/>
         <a:lumOff val="35000"/>
       </a:schemeClr>
     </cs:fontRef>
-    <cs:defRPr sz="1862" b="0" kern="1200" spc="0" baseline="0"/>
+    <cs:defRPr sz="2200" b="1" kern="1200" baseline="0"/>
   </cs:title>
   <cs:trendline>
     <cs:lnRef idx="0">
@@ -1028,14 +1137,14 @@
     <cs:fillRef idx="0"/>
     <cs:effectRef idx="0"/>
     <cs:fontRef idx="minor">
-      <a:schemeClr val="tx1"/>
+      <a:schemeClr val="dk1"/>
     </cs:fontRef>
     <cs:spPr>
       <a:ln w="19050" cap="rnd">
         <a:solidFill>
           <a:schemeClr val="phClr"/>
         </a:solidFill>
-        <a:prstDash val="sysDot"/>
+        <a:prstDash val="sysDash"/>
       </a:ln>
     </cs:spPr>
   </cs:trendline>
@@ -1044,7 +1153,7 @@
     <cs:fillRef idx="0"/>
     <cs:effectRef idx="0"/>
     <cs:fontRef idx="minor">
-      <a:schemeClr val="tx1">
+      <a:schemeClr val="dk1">
         <a:lumMod val="65000"/>
         <a:lumOff val="35000"/>
       </a:schemeClr>
@@ -1056,7 +1165,7 @@
     <cs:fillRef idx="0"/>
     <cs:effectRef idx="0"/>
     <cs:fontRef idx="minor">
-      <a:schemeClr val="tx1"/>
+      <a:schemeClr val="dk1"/>
     </cs:fontRef>
     <cs:spPr>
       <a:solidFill>
@@ -1064,7 +1173,7 @@
       </a:solidFill>
       <a:ln w="9525" cap="flat" cmpd="sng" algn="ctr">
         <a:solidFill>
-          <a:schemeClr val="tx1">
+          <a:schemeClr val="dk1">
             <a:lumMod val="65000"/>
             <a:lumOff val="35000"/>
           </a:schemeClr>
@@ -1078,7 +1187,7 @@
     <cs:fillRef idx="0"/>
     <cs:effectRef idx="0"/>
     <cs:fontRef idx="minor">
-      <a:schemeClr val="tx1">
+      <a:schemeClr val="dk1">
         <a:lumMod val="65000"/>
         <a:lumOff val="35000"/>
       </a:schemeClr>
@@ -1090,14 +1199,8 @@
     <cs:fillRef idx="0"/>
     <cs:effectRef idx="0"/>
     <cs:fontRef idx="minor">
-      <a:schemeClr val="tx1"/>
+      <a:schemeClr val="dk1"/>
     </cs:fontRef>
-    <cs:spPr>
-      <a:noFill/>
-      <a:ln>
-        <a:noFill/>
-      </a:ln>
-    </cs:spPr>
   </cs:wall>
 </cs:chartStyle>
 </file>
@@ -1652,6 +1755,115 @@
   <p:cSld>
     <p:spTree>
       <p:nvGrpSpPr>
+        <p:cNvPr id="1" name="Shape 163"/>
+        <p:cNvGrpSpPr/>
+        <p:nvPr/>
+      </p:nvGrpSpPr>
+      <p:grpSpPr>
+        <a:xfrm>
+          <a:off x="0" y="0"/>
+          <a:ext cx="0" cy="0"/>
+          <a:chOff x="0" y="0"/>
+          <a:chExt cx="0" cy="0"/>
+        </a:xfrm>
+      </p:grpSpPr>
+      <p:sp>
+        <p:nvSpPr>
+          <p:cNvPr id="164" name="Google Shape;164;g35f391192_09:notes"/>
+          <p:cNvSpPr>
+            <a:spLocks noGrp="1" noRot="1" noChangeAspect="1"/>
+          </p:cNvSpPr>
+          <p:nvPr>
+            <p:ph type="sldImg" idx="2"/>
+          </p:nvPr>
+        </p:nvSpPr>
+        <p:spPr>
+          <a:xfrm>
+            <a:off x="381000" y="685800"/>
+            <a:ext cx="6096000" cy="3429000"/>
+          </a:xfrm>
+          <a:custGeom>
+            <a:avLst/>
+            <a:gdLst/>
+            <a:ahLst/>
+            <a:cxnLst/>
+            <a:rect l="l" t="t" r="r" b="b"/>
+            <a:pathLst>
+              <a:path w="120000" h="120000" extrusionOk="0">
+                <a:moveTo>
+                  <a:pt x="0" y="0"/>
+                </a:moveTo>
+                <a:lnTo>
+                  <a:pt x="120000" y="0"/>
+                </a:lnTo>
+                <a:lnTo>
+                  <a:pt x="120000" y="120000"/>
+                </a:lnTo>
+                <a:lnTo>
+                  <a:pt x="0" y="120000"/>
+                </a:lnTo>
+                <a:close/>
+              </a:path>
+            </a:pathLst>
+          </a:custGeom>
+        </p:spPr>
+      </p:sp>
+      <p:sp>
+        <p:nvSpPr>
+          <p:cNvPr id="165" name="Google Shape;165;g35f391192_09:notes"/>
+          <p:cNvSpPr txBox="1">
+            <a:spLocks noGrp="1"/>
+          </p:cNvSpPr>
+          <p:nvPr>
+            <p:ph type="body" idx="1"/>
+          </p:nvPr>
+        </p:nvSpPr>
+        <p:spPr>
+          <a:xfrm>
+            <a:off x="685800" y="4343400"/>
+            <a:ext cx="5486400" cy="4114800"/>
+          </a:xfrm>
+          <a:prstGeom prst="rect">
+            <a:avLst/>
+          </a:prstGeom>
+        </p:spPr>
+        <p:txBody>
+          <a:bodyPr spcFirstLastPara="1" wrap="square" lIns="91425" tIns="91425" rIns="91425" bIns="91425" anchor="t" anchorCtr="0">
+            <a:noAutofit/>
+          </a:bodyPr>
+          <a:lstStyle/>
+          <a:p>
+            <a:pPr marL="0" lvl="0" indent="0" algn="l" rtl="0">
+              <a:spcBef>
+                <a:spcPts val="0"/>
+              </a:spcBef>
+              <a:spcAft>
+                <a:spcPts val="0"/>
+              </a:spcAft>
+              <a:buNone/>
+            </a:pPr>
+            <a:endParaRPr/>
+          </a:p>
+        </p:txBody>
+      </p:sp>
+    </p:spTree>
+    <p:extLst>
+      <p:ext uri="{BB962C8B-B14F-4D97-AF65-F5344CB8AC3E}">
+        <p14:creationId xmlns:p14="http://schemas.microsoft.com/office/powerpoint/2010/main" val="1871442957"/>
+      </p:ext>
+    </p:extLst>
+  </p:cSld>
+  <p:clrMapOvr>
+    <a:masterClrMapping/>
+  </p:clrMapOvr>
+</p:notes>
+</file>
+
+<file path=ppt/notesSlides/notesSlide11.xml><?xml version="1.0" encoding="utf-8"?>
+<p:notes xmlns:a="http://schemas.openxmlformats.org/drawingml/2006/main" xmlns:r="http://schemas.openxmlformats.org/officeDocument/2006/relationships" xmlns:p="http://schemas.openxmlformats.org/presentationml/2006/main" showMasterSp="0" showMasterPhAnim="0">
+  <p:cSld>
+    <p:spTree>
+      <p:nvGrpSpPr>
         <p:cNvPr id="1" name="Shape 357"/>
         <p:cNvGrpSpPr/>
         <p:nvPr/>
@@ -1756,7 +1968,7 @@
 </p:notes>
 </file>
 
-<file path=ppt/notesSlides/notesSlide11.xml><?xml version="1.0" encoding="utf-8"?>
+<file path=ppt/notesSlides/notesSlide12.xml><?xml version="1.0" encoding="utf-8"?>
 <p:notes xmlns:a="http://schemas.openxmlformats.org/drawingml/2006/main" xmlns:r="http://schemas.openxmlformats.org/officeDocument/2006/relationships" xmlns:p="http://schemas.openxmlformats.org/presentationml/2006/main" showMasterSp="0" showMasterPhAnim="0">
   <p:cSld>
     <p:spTree>
@@ -1817,110 +2029,6 @@
       <p:sp>
         <p:nvSpPr>
           <p:cNvPr id="220" name="Google Shape;220;g35f391192_045:notes"/>
-          <p:cNvSpPr txBox="1">
-            <a:spLocks noGrp="1"/>
-          </p:cNvSpPr>
-          <p:nvPr>
-            <p:ph type="body" idx="1"/>
-          </p:nvPr>
-        </p:nvSpPr>
-        <p:spPr>
-          <a:xfrm>
-            <a:off x="685800" y="4343400"/>
-            <a:ext cx="5486400" cy="4114800"/>
-          </a:xfrm>
-          <a:prstGeom prst="rect">
-            <a:avLst/>
-          </a:prstGeom>
-        </p:spPr>
-        <p:txBody>
-          <a:bodyPr spcFirstLastPara="1" wrap="square" lIns="91425" tIns="91425" rIns="91425" bIns="91425" anchor="t" anchorCtr="0">
-            <a:noAutofit/>
-          </a:bodyPr>
-          <a:lstStyle/>
-          <a:p>
-            <a:pPr marL="0" lvl="0" indent="0" algn="l" rtl="0">
-              <a:spcBef>
-                <a:spcPts val="0"/>
-              </a:spcBef>
-              <a:spcAft>
-                <a:spcPts val="0"/>
-              </a:spcAft>
-              <a:buNone/>
-            </a:pPr>
-            <a:endParaRPr/>
-          </a:p>
-        </p:txBody>
-      </p:sp>
-    </p:spTree>
-  </p:cSld>
-  <p:clrMapOvr>
-    <a:masterClrMapping/>
-  </p:clrMapOvr>
-</p:notes>
-</file>
-
-<file path=ppt/notesSlides/notesSlide12.xml><?xml version="1.0" encoding="utf-8"?>
-<p:notes xmlns:a="http://schemas.openxmlformats.org/drawingml/2006/main" xmlns:r="http://schemas.openxmlformats.org/officeDocument/2006/relationships" xmlns:p="http://schemas.openxmlformats.org/presentationml/2006/main" showMasterSp="0" showMasterPhAnim="0">
-  <p:cSld>
-    <p:spTree>
-      <p:nvGrpSpPr>
-        <p:cNvPr id="1" name="Shape 259"/>
-        <p:cNvGrpSpPr/>
-        <p:nvPr/>
-      </p:nvGrpSpPr>
-      <p:grpSpPr>
-        <a:xfrm>
-          <a:off x="0" y="0"/>
-          <a:ext cx="0" cy="0"/>
-          <a:chOff x="0" y="0"/>
-          <a:chExt cx="0" cy="0"/>
-        </a:xfrm>
-      </p:grpSpPr>
-      <p:sp>
-        <p:nvSpPr>
-          <p:cNvPr id="260" name="Google Shape;260;g35f391192_085:notes"/>
-          <p:cNvSpPr>
-            <a:spLocks noGrp="1" noRot="1" noChangeAspect="1"/>
-          </p:cNvSpPr>
-          <p:nvPr>
-            <p:ph type="sldImg" idx="2"/>
-          </p:nvPr>
-        </p:nvSpPr>
-        <p:spPr>
-          <a:xfrm>
-            <a:off x="381000" y="685800"/>
-            <a:ext cx="6096000" cy="3429000"/>
-          </a:xfrm>
-          <a:custGeom>
-            <a:avLst/>
-            <a:gdLst/>
-            <a:ahLst/>
-            <a:cxnLst/>
-            <a:rect l="l" t="t" r="r" b="b"/>
-            <a:pathLst>
-              <a:path w="120000" h="120000" extrusionOk="0">
-                <a:moveTo>
-                  <a:pt x="0" y="0"/>
-                </a:moveTo>
-                <a:lnTo>
-                  <a:pt x="120000" y="0"/>
-                </a:lnTo>
-                <a:lnTo>
-                  <a:pt x="120000" y="120000"/>
-                </a:lnTo>
-                <a:lnTo>
-                  <a:pt x="0" y="120000"/>
-                </a:lnTo>
-                <a:close/>
-              </a:path>
-            </a:pathLst>
-          </a:custGeom>
-        </p:spPr>
-      </p:sp>
-      <p:sp>
-        <p:nvSpPr>
-          <p:cNvPr id="261" name="Google Shape;261;g35f391192_085:notes"/>
           <p:cNvSpPr txBox="1">
             <a:spLocks noGrp="1"/>
           </p:cNvSpPr>
@@ -2063,7 +2171,7 @@
     </p:spTree>
     <p:extLst>
       <p:ext uri="{BB962C8B-B14F-4D97-AF65-F5344CB8AC3E}">
-        <p14:creationId xmlns:p14="http://schemas.microsoft.com/office/powerpoint/2010/main" val="817346397"/>
+        <p14:creationId xmlns:p14="http://schemas.microsoft.com/office/powerpoint/2010/main" val="2925013035"/>
       </p:ext>
     </p:extLst>
   </p:cSld>
@@ -2170,11 +2278,6 @@
         </p:txBody>
       </p:sp>
     </p:spTree>
-    <p:extLst>
-      <p:ext uri="{BB962C8B-B14F-4D97-AF65-F5344CB8AC3E}">
-        <p14:creationId xmlns:p14="http://schemas.microsoft.com/office/powerpoint/2010/main" val="913512136"/>
-      </p:ext>
-    </p:extLst>
   </p:cSld>
   <p:clrMapOvr>
     <a:masterClrMapping/>
@@ -2281,7 +2384,334 @@
     </p:spTree>
     <p:extLst>
       <p:ext uri="{BB962C8B-B14F-4D97-AF65-F5344CB8AC3E}">
+        <p14:creationId xmlns:p14="http://schemas.microsoft.com/office/powerpoint/2010/main" val="817346397"/>
+      </p:ext>
+    </p:extLst>
+  </p:cSld>
+  <p:clrMapOvr>
+    <a:masterClrMapping/>
+  </p:clrMapOvr>
+</p:notes>
+</file>
+
+<file path=ppt/notesSlides/notesSlide16.xml><?xml version="1.0" encoding="utf-8"?>
+<p:notes xmlns:a="http://schemas.openxmlformats.org/drawingml/2006/main" xmlns:r="http://schemas.openxmlformats.org/officeDocument/2006/relationships" xmlns:p="http://schemas.openxmlformats.org/presentationml/2006/main" showMasterSp="0" showMasterPhAnim="0">
+  <p:cSld>
+    <p:spTree>
+      <p:nvGrpSpPr>
+        <p:cNvPr id="1" name="Shape 259"/>
+        <p:cNvGrpSpPr/>
+        <p:nvPr/>
+      </p:nvGrpSpPr>
+      <p:grpSpPr>
+        <a:xfrm>
+          <a:off x="0" y="0"/>
+          <a:ext cx="0" cy="0"/>
+          <a:chOff x="0" y="0"/>
+          <a:chExt cx="0" cy="0"/>
+        </a:xfrm>
+      </p:grpSpPr>
+      <p:sp>
+        <p:nvSpPr>
+          <p:cNvPr id="260" name="Google Shape;260;g35f391192_085:notes"/>
+          <p:cNvSpPr>
+            <a:spLocks noGrp="1" noRot="1" noChangeAspect="1"/>
+          </p:cNvSpPr>
+          <p:nvPr>
+            <p:ph type="sldImg" idx="2"/>
+          </p:nvPr>
+        </p:nvSpPr>
+        <p:spPr>
+          <a:xfrm>
+            <a:off x="381000" y="685800"/>
+            <a:ext cx="6096000" cy="3429000"/>
+          </a:xfrm>
+          <a:custGeom>
+            <a:avLst/>
+            <a:gdLst/>
+            <a:ahLst/>
+            <a:cxnLst/>
+            <a:rect l="l" t="t" r="r" b="b"/>
+            <a:pathLst>
+              <a:path w="120000" h="120000" extrusionOk="0">
+                <a:moveTo>
+                  <a:pt x="0" y="0"/>
+                </a:moveTo>
+                <a:lnTo>
+                  <a:pt x="120000" y="0"/>
+                </a:lnTo>
+                <a:lnTo>
+                  <a:pt x="120000" y="120000"/>
+                </a:lnTo>
+                <a:lnTo>
+                  <a:pt x="0" y="120000"/>
+                </a:lnTo>
+                <a:close/>
+              </a:path>
+            </a:pathLst>
+          </a:custGeom>
+        </p:spPr>
+      </p:sp>
+      <p:sp>
+        <p:nvSpPr>
+          <p:cNvPr id="261" name="Google Shape;261;g35f391192_085:notes"/>
+          <p:cNvSpPr txBox="1">
+            <a:spLocks noGrp="1"/>
+          </p:cNvSpPr>
+          <p:nvPr>
+            <p:ph type="body" idx="1"/>
+          </p:nvPr>
+        </p:nvSpPr>
+        <p:spPr>
+          <a:xfrm>
+            <a:off x="685800" y="4343400"/>
+            <a:ext cx="5486400" cy="4114800"/>
+          </a:xfrm>
+          <a:prstGeom prst="rect">
+            <a:avLst/>
+          </a:prstGeom>
+        </p:spPr>
+        <p:txBody>
+          <a:bodyPr spcFirstLastPara="1" wrap="square" lIns="91425" tIns="91425" rIns="91425" bIns="91425" anchor="t" anchorCtr="0">
+            <a:noAutofit/>
+          </a:bodyPr>
+          <a:lstStyle/>
+          <a:p>
+            <a:pPr marL="0" lvl="0" indent="0" algn="l" rtl="0">
+              <a:spcBef>
+                <a:spcPts val="0"/>
+              </a:spcBef>
+              <a:spcAft>
+                <a:spcPts val="0"/>
+              </a:spcAft>
+              <a:buNone/>
+            </a:pPr>
+            <a:endParaRPr/>
+          </a:p>
+        </p:txBody>
+      </p:sp>
+    </p:spTree>
+    <p:extLst>
+      <p:ext uri="{BB962C8B-B14F-4D97-AF65-F5344CB8AC3E}">
+        <p14:creationId xmlns:p14="http://schemas.microsoft.com/office/powerpoint/2010/main" val="913512136"/>
+      </p:ext>
+    </p:extLst>
+  </p:cSld>
+  <p:clrMapOvr>
+    <a:masterClrMapping/>
+  </p:clrMapOvr>
+</p:notes>
+</file>
+
+<file path=ppt/notesSlides/notesSlide17.xml><?xml version="1.0" encoding="utf-8"?>
+<p:notes xmlns:a="http://schemas.openxmlformats.org/drawingml/2006/main" xmlns:r="http://schemas.openxmlformats.org/officeDocument/2006/relationships" xmlns:p="http://schemas.openxmlformats.org/presentationml/2006/main" showMasterSp="0" showMasterPhAnim="0">
+  <p:cSld>
+    <p:spTree>
+      <p:nvGrpSpPr>
+        <p:cNvPr id="1" name="Shape 259"/>
+        <p:cNvGrpSpPr/>
+        <p:nvPr/>
+      </p:nvGrpSpPr>
+      <p:grpSpPr>
+        <a:xfrm>
+          <a:off x="0" y="0"/>
+          <a:ext cx="0" cy="0"/>
+          <a:chOff x="0" y="0"/>
+          <a:chExt cx="0" cy="0"/>
+        </a:xfrm>
+      </p:grpSpPr>
+      <p:sp>
+        <p:nvSpPr>
+          <p:cNvPr id="260" name="Google Shape;260;g35f391192_085:notes"/>
+          <p:cNvSpPr>
+            <a:spLocks noGrp="1" noRot="1" noChangeAspect="1"/>
+          </p:cNvSpPr>
+          <p:nvPr>
+            <p:ph type="sldImg" idx="2"/>
+          </p:nvPr>
+        </p:nvSpPr>
+        <p:spPr>
+          <a:xfrm>
+            <a:off x="381000" y="685800"/>
+            <a:ext cx="6096000" cy="3429000"/>
+          </a:xfrm>
+          <a:custGeom>
+            <a:avLst/>
+            <a:gdLst/>
+            <a:ahLst/>
+            <a:cxnLst/>
+            <a:rect l="l" t="t" r="r" b="b"/>
+            <a:pathLst>
+              <a:path w="120000" h="120000" extrusionOk="0">
+                <a:moveTo>
+                  <a:pt x="0" y="0"/>
+                </a:moveTo>
+                <a:lnTo>
+                  <a:pt x="120000" y="0"/>
+                </a:lnTo>
+                <a:lnTo>
+                  <a:pt x="120000" y="120000"/>
+                </a:lnTo>
+                <a:lnTo>
+                  <a:pt x="0" y="120000"/>
+                </a:lnTo>
+                <a:close/>
+              </a:path>
+            </a:pathLst>
+          </a:custGeom>
+        </p:spPr>
+      </p:sp>
+      <p:sp>
+        <p:nvSpPr>
+          <p:cNvPr id="261" name="Google Shape;261;g35f391192_085:notes"/>
+          <p:cNvSpPr txBox="1">
+            <a:spLocks noGrp="1"/>
+          </p:cNvSpPr>
+          <p:nvPr>
+            <p:ph type="body" idx="1"/>
+          </p:nvPr>
+        </p:nvSpPr>
+        <p:spPr>
+          <a:xfrm>
+            <a:off x="685800" y="4343400"/>
+            <a:ext cx="5486400" cy="4114800"/>
+          </a:xfrm>
+          <a:prstGeom prst="rect">
+            <a:avLst/>
+          </a:prstGeom>
+        </p:spPr>
+        <p:txBody>
+          <a:bodyPr spcFirstLastPara="1" wrap="square" lIns="91425" tIns="91425" rIns="91425" bIns="91425" anchor="t" anchorCtr="0">
+            <a:noAutofit/>
+          </a:bodyPr>
+          <a:lstStyle/>
+          <a:p>
+            <a:pPr marL="0" lvl="0" indent="0" algn="l" rtl="0">
+              <a:spcBef>
+                <a:spcPts val="0"/>
+              </a:spcBef>
+              <a:spcAft>
+                <a:spcPts val="0"/>
+              </a:spcAft>
+              <a:buNone/>
+            </a:pPr>
+            <a:endParaRPr/>
+          </a:p>
+        </p:txBody>
+      </p:sp>
+    </p:spTree>
+    <p:extLst>
+      <p:ext uri="{BB962C8B-B14F-4D97-AF65-F5344CB8AC3E}">
         <p14:creationId xmlns:p14="http://schemas.microsoft.com/office/powerpoint/2010/main" val="3433687766"/>
+      </p:ext>
+    </p:extLst>
+  </p:cSld>
+  <p:clrMapOvr>
+    <a:masterClrMapping/>
+  </p:clrMapOvr>
+</p:notes>
+</file>
+
+<file path=ppt/notesSlides/notesSlide18.xml><?xml version="1.0" encoding="utf-8"?>
+<p:notes xmlns:a="http://schemas.openxmlformats.org/drawingml/2006/main" xmlns:r="http://schemas.openxmlformats.org/officeDocument/2006/relationships" xmlns:p="http://schemas.openxmlformats.org/presentationml/2006/main" showMasterSp="0" showMasterPhAnim="0">
+  <p:cSld>
+    <p:spTree>
+      <p:nvGrpSpPr>
+        <p:cNvPr id="1" name="Shape 259"/>
+        <p:cNvGrpSpPr/>
+        <p:nvPr/>
+      </p:nvGrpSpPr>
+      <p:grpSpPr>
+        <a:xfrm>
+          <a:off x="0" y="0"/>
+          <a:ext cx="0" cy="0"/>
+          <a:chOff x="0" y="0"/>
+          <a:chExt cx="0" cy="0"/>
+        </a:xfrm>
+      </p:grpSpPr>
+      <p:sp>
+        <p:nvSpPr>
+          <p:cNvPr id="260" name="Google Shape;260;g35f391192_085:notes"/>
+          <p:cNvSpPr>
+            <a:spLocks noGrp="1" noRot="1" noChangeAspect="1"/>
+          </p:cNvSpPr>
+          <p:nvPr>
+            <p:ph type="sldImg" idx="2"/>
+          </p:nvPr>
+        </p:nvSpPr>
+        <p:spPr>
+          <a:xfrm>
+            <a:off x="381000" y="685800"/>
+            <a:ext cx="6096000" cy="3429000"/>
+          </a:xfrm>
+          <a:custGeom>
+            <a:avLst/>
+            <a:gdLst/>
+            <a:ahLst/>
+            <a:cxnLst/>
+            <a:rect l="l" t="t" r="r" b="b"/>
+            <a:pathLst>
+              <a:path w="120000" h="120000" extrusionOk="0">
+                <a:moveTo>
+                  <a:pt x="0" y="0"/>
+                </a:moveTo>
+                <a:lnTo>
+                  <a:pt x="120000" y="0"/>
+                </a:lnTo>
+                <a:lnTo>
+                  <a:pt x="120000" y="120000"/>
+                </a:lnTo>
+                <a:lnTo>
+                  <a:pt x="0" y="120000"/>
+                </a:lnTo>
+                <a:close/>
+              </a:path>
+            </a:pathLst>
+          </a:custGeom>
+        </p:spPr>
+      </p:sp>
+      <p:sp>
+        <p:nvSpPr>
+          <p:cNvPr id="261" name="Google Shape;261;g35f391192_085:notes"/>
+          <p:cNvSpPr txBox="1">
+            <a:spLocks noGrp="1"/>
+          </p:cNvSpPr>
+          <p:nvPr>
+            <p:ph type="body" idx="1"/>
+          </p:nvPr>
+        </p:nvSpPr>
+        <p:spPr>
+          <a:xfrm>
+            <a:off x="685800" y="4343400"/>
+            <a:ext cx="5486400" cy="4114800"/>
+          </a:xfrm>
+          <a:prstGeom prst="rect">
+            <a:avLst/>
+          </a:prstGeom>
+        </p:spPr>
+        <p:txBody>
+          <a:bodyPr spcFirstLastPara="1" wrap="square" lIns="91425" tIns="91425" rIns="91425" bIns="91425" anchor="t" anchorCtr="0">
+            <a:noAutofit/>
+          </a:bodyPr>
+          <a:lstStyle/>
+          <a:p>
+            <a:pPr marL="0" lvl="0" indent="0" algn="l" rtl="0">
+              <a:spcBef>
+                <a:spcPts val="0"/>
+              </a:spcBef>
+              <a:spcAft>
+                <a:spcPts val="0"/>
+              </a:spcAft>
+              <a:buNone/>
+            </a:pPr>
+            <a:endParaRPr/>
+          </a:p>
+        </p:txBody>
+      </p:sp>
+    </p:spTree>
+    <p:extLst>
+      <p:ext uri="{BB962C8B-B14F-4D97-AF65-F5344CB8AC3E}">
+        <p14:creationId xmlns:p14="http://schemas.microsoft.com/office/powerpoint/2010/main" val="4191361661"/>
       </p:ext>
     </p:extLst>
   </p:cSld>
@@ -2727,7 +3157,7 @@
   <p:cSld>
     <p:spTree>
       <p:nvGrpSpPr>
-        <p:cNvPr id="1" name="Shape 163"/>
+        <p:cNvPr id="1" name="Shape 176"/>
         <p:cNvGrpSpPr/>
         <p:nvPr/>
       </p:nvGrpSpPr>
@@ -2741,7 +3171,7 @@
       </p:grpSpPr>
       <p:sp>
         <p:nvSpPr>
-          <p:cNvPr id="164" name="Google Shape;164;g35f391192_09:notes"/>
+          <p:cNvPr id="177" name="Google Shape;177;g35ed75ccf_015:notes"/>
           <p:cNvSpPr>
             <a:spLocks noGrp="1" noRot="1" noChangeAspect="1"/>
           </p:cNvSpPr>
@@ -2782,7 +3212,7 @@
       </p:sp>
       <p:sp>
         <p:nvSpPr>
-          <p:cNvPr id="165" name="Google Shape;165;g35f391192_09:notes"/>
+          <p:cNvPr id="178" name="Google Shape;178;g35ed75ccf_015:notes"/>
           <p:cNvSpPr txBox="1">
             <a:spLocks noGrp="1"/>
           </p:cNvSpPr>
@@ -2819,6 +3249,11 @@
         </p:txBody>
       </p:sp>
     </p:spTree>
+    <p:extLst>
+      <p:ext uri="{BB962C8B-B14F-4D97-AF65-F5344CB8AC3E}">
+        <p14:creationId xmlns:p14="http://schemas.microsoft.com/office/powerpoint/2010/main" val="3598818422"/>
+      </p:ext>
+    </p:extLst>
   </p:cSld>
   <p:clrMapOvr>
     <a:masterClrMapping/>
@@ -2923,11 +3358,6 @@
         </p:txBody>
       </p:sp>
     </p:spTree>
-    <p:extLst>
-      <p:ext uri="{BB962C8B-B14F-4D97-AF65-F5344CB8AC3E}">
-        <p14:creationId xmlns:p14="http://schemas.microsoft.com/office/powerpoint/2010/main" val="1478617030"/>
-      </p:ext>
-    </p:extLst>
   </p:cSld>
   <p:clrMapOvr>
     <a:masterClrMapping/>
@@ -3027,14 +3457,14 @@
               </a:spcAft>
               <a:buNone/>
             </a:pPr>
-            <a:endParaRPr dirty="0"/>
+            <a:endParaRPr/>
           </a:p>
         </p:txBody>
       </p:sp>
     </p:spTree>
     <p:extLst>
       <p:ext uri="{BB962C8B-B14F-4D97-AF65-F5344CB8AC3E}">
-        <p14:creationId xmlns:p14="http://schemas.microsoft.com/office/powerpoint/2010/main" val="2242052519"/>
+        <p14:creationId xmlns:p14="http://schemas.microsoft.com/office/powerpoint/2010/main" val="1478617030"/>
       </p:ext>
     </p:extLst>
   </p:cSld>
@@ -3136,14 +3566,14 @@
               </a:spcAft>
               <a:buNone/>
             </a:pPr>
-            <a:endParaRPr/>
+            <a:endParaRPr dirty="0"/>
           </a:p>
         </p:txBody>
       </p:sp>
     </p:spTree>
     <p:extLst>
       <p:ext uri="{BB962C8B-B14F-4D97-AF65-F5344CB8AC3E}">
-        <p14:creationId xmlns:p14="http://schemas.microsoft.com/office/powerpoint/2010/main" val="1871442957"/>
+        <p14:creationId xmlns:p14="http://schemas.microsoft.com/office/powerpoint/2010/main" val="2242052519"/>
       </p:ext>
     </p:extLst>
   </p:cSld>
@@ -11045,6 +11475,134 @@
     </p:bg>
     <p:spTree>
       <p:nvGrpSpPr>
+        <p:cNvPr id="1" name="Shape 166"/>
+        <p:cNvGrpSpPr/>
+        <p:nvPr/>
+      </p:nvGrpSpPr>
+      <p:grpSpPr>
+        <a:xfrm>
+          <a:off x="0" y="0"/>
+          <a:ext cx="0" cy="0"/>
+          <a:chOff x="0" y="0"/>
+          <a:chExt cx="0" cy="0"/>
+        </a:xfrm>
+      </p:grpSpPr>
+      <p:sp>
+        <p:nvSpPr>
+          <p:cNvPr id="167" name="Google Shape;167;p17"/>
+          <p:cNvSpPr txBox="1">
+            <a:spLocks noGrp="1"/>
+          </p:cNvSpPr>
+          <p:nvPr>
+            <p:ph type="body" idx="1"/>
+          </p:nvPr>
+        </p:nvSpPr>
+        <p:spPr>
+          <a:xfrm>
+            <a:off x="591661" y="1090671"/>
+            <a:ext cx="7967548" cy="2638549"/>
+          </a:xfrm>
+          <a:prstGeom prst="rect">
+            <a:avLst/>
+          </a:prstGeom>
+        </p:spPr>
+        <p:txBody>
+          <a:bodyPr spcFirstLastPara="1" wrap="square" lIns="0" tIns="0" rIns="0" bIns="0" anchor="t" anchorCtr="0">
+            <a:noAutofit/>
+          </a:bodyPr>
+          <a:lstStyle/>
+          <a:p>
+            <a:pPr marL="0" lvl="0" indent="0" algn="ctr">
+              <a:buNone/>
+            </a:pPr>
+            <a:r>
+              <a:rPr lang="pt-BR" sz="2400" dirty="0">
+                <a:latin typeface="Roboto Slab"/>
+                <a:cs typeface="Segoe UI" panose="020B0502040204020203" pitchFamily="34" charset="0"/>
+              </a:rPr>
+              <a:t>Nossa </a:t>
+            </a:r>
+            <a:r>
+              <a:rPr lang="pt-BR" sz="3200" b="1" dirty="0">
+                <a:latin typeface="Roboto Slab"/>
+                <a:cs typeface="Segoe UI" panose="020B0502040204020203" pitchFamily="34" charset="0"/>
+              </a:rPr>
+              <a:t>solução</a:t>
+            </a:r>
+            <a:r>
+              <a:rPr lang="pt-BR" sz="2400" dirty="0">
+                <a:latin typeface="Roboto Slab"/>
+                <a:cs typeface="Segoe UI" panose="020B0502040204020203" pitchFamily="34" charset="0"/>
+              </a:rPr>
+              <a:t> irá transformar os dados coletados em conforto e agilidade, tanto para quem consome e para quem fornece. Um serviço eficiente garante o melhor feedback dos clientes.</a:t>
+            </a:r>
+          </a:p>
+        </p:txBody>
+      </p:sp>
+      <p:pic>
+        <p:nvPicPr>
+          <p:cNvPr id="16" name="Imagem 15">
+            <a:extLst>
+              <a:ext uri="{FF2B5EF4-FFF2-40B4-BE49-F238E27FC236}">
+                <a16:creationId xmlns:a16="http://schemas.microsoft.com/office/drawing/2014/main" id="{E93810CB-BACE-42DE-B9A9-882176EB8008}"/>
+              </a:ext>
+            </a:extLst>
+          </p:cNvPr>
+          <p:cNvPicPr>
+            <a:picLocks noChangeAspect="1"/>
+          </p:cNvPicPr>
+          <p:nvPr/>
+        </p:nvPicPr>
+        <p:blipFill>
+          <a:blip r:embed="rId3"/>
+          <a:stretch>
+            <a:fillRect/>
+          </a:stretch>
+        </p:blipFill>
+        <p:spPr>
+          <a:xfrm>
+            <a:off x="8559209" y="4561643"/>
+            <a:ext cx="444093" cy="444093"/>
+          </a:xfrm>
+          <a:prstGeom prst="rect">
+            <a:avLst/>
+          </a:prstGeom>
+        </p:spPr>
+      </p:pic>
+    </p:spTree>
+    <p:extLst>
+      <p:ext uri="{BB962C8B-B14F-4D97-AF65-F5344CB8AC3E}">
+        <p14:creationId xmlns:p14="http://schemas.microsoft.com/office/powerpoint/2010/main" val="3282627685"/>
+      </p:ext>
+    </p:extLst>
+  </p:cSld>
+  <p:clrMapOvr>
+    <a:masterClrMapping/>
+  </p:clrMapOvr>
+</p:sld>
+</file>
+
+<file path=ppt/slides/slide11.xml><?xml version="1.0" encoding="utf-8"?>
+<p:sld xmlns:a="http://schemas.openxmlformats.org/drawingml/2006/main" xmlns:r="http://schemas.openxmlformats.org/officeDocument/2006/relationships" xmlns:p="http://schemas.openxmlformats.org/presentationml/2006/main">
+  <p:cSld>
+    <p:bg>
+      <p:bgPr>
+        <a:gradFill>
+          <a:gsLst>
+            <a:gs pos="0">
+              <a:srgbClr val="514A9D"/>
+            </a:gs>
+            <a:gs pos="100000">
+              <a:srgbClr val="4BBDD8"/>
+            </a:gs>
+          </a:gsLst>
+          <a:lin ang="0" scaled="0"/>
+        </a:gradFill>
+        <a:effectLst/>
+      </p:bgPr>
+    </p:bg>
+    <p:spTree>
+      <p:nvGrpSpPr>
         <p:cNvPr id="1" name="Shape 360"/>
         <p:cNvGrpSpPr/>
         <p:nvPr/>
@@ -11611,7 +12169,7 @@
 </p:sld>
 </file>
 
-<file path=ppt/slides/slide11.xml><?xml version="1.0" encoding="utf-8"?>
+<file path=ppt/slides/slide12.xml><?xml version="1.0" encoding="utf-8"?>
 <p:sld xmlns:a="http://schemas.openxmlformats.org/drawingml/2006/main" xmlns:r="http://schemas.openxmlformats.org/officeDocument/2006/relationships" xmlns:p="http://schemas.openxmlformats.org/presentationml/2006/main">
   <p:cSld>
     <p:bg>
@@ -11935,7 +12493,146 @@
 </p:sld>
 </file>
 
-<file path=ppt/slides/slide12.xml><?xml version="1.0" encoding="utf-8"?>
+<file path=ppt/slides/slide13.xml><?xml version="1.0" encoding="utf-8"?>
+<p:sld xmlns:a="http://schemas.openxmlformats.org/drawingml/2006/main" xmlns:r="http://schemas.openxmlformats.org/officeDocument/2006/relationships" xmlns:p="http://schemas.openxmlformats.org/presentationml/2006/main">
+  <p:cSld>
+    <p:bg>
+      <p:bgPr>
+        <a:gradFill>
+          <a:gsLst>
+            <a:gs pos="0">
+              <a:srgbClr val="514A9D"/>
+            </a:gs>
+            <a:gs pos="100000">
+              <a:srgbClr val="4BBDD8"/>
+            </a:gs>
+          </a:gsLst>
+          <a:lin ang="0" scaled="0"/>
+        </a:gradFill>
+        <a:effectLst/>
+      </p:bgPr>
+    </p:bg>
+    <p:spTree>
+      <p:nvGrpSpPr>
+        <p:cNvPr id="1" name="Shape 262"/>
+        <p:cNvGrpSpPr/>
+        <p:nvPr/>
+      </p:nvGrpSpPr>
+      <p:grpSpPr>
+        <a:xfrm>
+          <a:off x="0" y="0"/>
+          <a:ext cx="0" cy="0"/>
+          <a:chOff x="0" y="0"/>
+          <a:chExt cx="0" cy="0"/>
+        </a:xfrm>
+      </p:grpSpPr>
+      <p:sp>
+        <p:nvSpPr>
+          <p:cNvPr id="263" name="Google Shape;263;p26"/>
+          <p:cNvSpPr txBox="1">
+            <a:spLocks noGrp="1"/>
+          </p:cNvSpPr>
+          <p:nvPr>
+            <p:ph type="title"/>
+          </p:nvPr>
+        </p:nvSpPr>
+        <p:spPr>
+          <a:xfrm>
+            <a:off x="259225" y="0"/>
+            <a:ext cx="6067147" cy="1363074"/>
+          </a:xfrm>
+          <a:prstGeom prst="rect">
+            <a:avLst/>
+          </a:prstGeom>
+        </p:spPr>
+        <p:txBody>
+          <a:bodyPr spcFirstLastPara="1" wrap="square" lIns="0" tIns="0" rIns="0" bIns="0" anchor="ctr" anchorCtr="0">
+            <a:noAutofit/>
+          </a:bodyPr>
+          <a:lstStyle/>
+          <a:p>
+            <a:pPr lvl="0"/>
+            <a:r>
+              <a:rPr lang="pt-BR" dirty="0"/>
+              <a:t>Riscos do projeto</a:t>
+            </a:r>
+          </a:p>
+        </p:txBody>
+      </p:sp>
+      <p:pic>
+        <p:nvPicPr>
+          <p:cNvPr id="6" name="Imagem 5">
+            <a:extLst>
+              <a:ext uri="{FF2B5EF4-FFF2-40B4-BE49-F238E27FC236}">
+                <a16:creationId xmlns:a16="http://schemas.microsoft.com/office/drawing/2014/main" id="{3CD8B38D-7204-4413-9DB8-9C9E9AE43ED8}"/>
+              </a:ext>
+            </a:extLst>
+          </p:cNvPr>
+          <p:cNvPicPr>
+            <a:picLocks noChangeAspect="1"/>
+          </p:cNvPicPr>
+          <p:nvPr/>
+        </p:nvPicPr>
+        <p:blipFill>
+          <a:blip r:embed="rId3"/>
+          <a:stretch>
+            <a:fillRect/>
+          </a:stretch>
+        </p:blipFill>
+        <p:spPr>
+          <a:xfrm>
+            <a:off x="8559209" y="4561643"/>
+            <a:ext cx="444093" cy="444093"/>
+          </a:xfrm>
+          <a:prstGeom prst="rect">
+            <a:avLst/>
+          </a:prstGeom>
+        </p:spPr>
+      </p:pic>
+      <p:pic>
+        <p:nvPicPr>
+          <p:cNvPr id="2" name="Imagem 1">
+            <a:extLst>
+              <a:ext uri="{FF2B5EF4-FFF2-40B4-BE49-F238E27FC236}">
+                <a16:creationId xmlns:a16="http://schemas.microsoft.com/office/drawing/2014/main" id="{925955C4-643E-48B9-876B-E29DA406C6B3}"/>
+              </a:ext>
+            </a:extLst>
+          </p:cNvPr>
+          <p:cNvPicPr>
+            <a:picLocks noChangeAspect="1"/>
+          </p:cNvPicPr>
+          <p:nvPr/>
+        </p:nvPicPr>
+        <p:blipFill>
+          <a:blip r:embed="rId4"/>
+          <a:stretch>
+            <a:fillRect/>
+          </a:stretch>
+        </p:blipFill>
+        <p:spPr>
+          <a:xfrm>
+            <a:off x="277684" y="1813157"/>
+            <a:ext cx="8588632" cy="2748486"/>
+          </a:xfrm>
+          <a:prstGeom prst="rect">
+            <a:avLst/>
+          </a:prstGeom>
+        </p:spPr>
+      </p:pic>
+    </p:spTree>
+    <p:extLst>
+      <p:ext uri="{BB962C8B-B14F-4D97-AF65-F5344CB8AC3E}">
+        <p14:creationId xmlns:p14="http://schemas.microsoft.com/office/powerpoint/2010/main" val="2241294111"/>
+      </p:ext>
+    </p:extLst>
+  </p:cSld>
+  <p:clrMapOvr>
+    <a:masterClrMapping/>
+  </p:clrMapOvr>
+</p:sld>
+</file>
+
+<file path=ppt/slides/slide14.xml><?xml version="1.0" encoding="utf-8"?>
 <p:sld xmlns:a="http://schemas.openxmlformats.org/drawingml/2006/main" xmlns:r="http://schemas.openxmlformats.org/officeDocument/2006/relationships" xmlns:p="http://schemas.openxmlformats.org/presentationml/2006/main">
   <p:cSld>
     <p:bg>
@@ -12023,14 +12720,14 @@
           <p:nvPr>
             <p:extLst>
               <p:ext uri="{D42A27DB-BD31-4B8C-83A1-F6EECF244321}">
-                <p14:modId xmlns:p14="http://schemas.microsoft.com/office/powerpoint/2010/main" val="1164709907"/>
+                <p14:modId xmlns:p14="http://schemas.microsoft.com/office/powerpoint/2010/main" val="3257736284"/>
               </p:ext>
             </p:extLst>
           </p:nvPr>
         </p:nvGraphicFramePr>
         <p:xfrm>
-          <a:off x="467834" y="1612662"/>
-          <a:ext cx="8052615" cy="2933994"/>
+          <a:off x="818707" y="1612662"/>
+          <a:ext cx="7272670" cy="2933994"/>
         </p:xfrm>
         <a:graphic>
           <a:graphicData uri="http://schemas.openxmlformats.org/drawingml/2006/table">
@@ -12039,21 +12736,21 @@
                 <a:tableStyleId>{775DCB02-9BB8-47FD-8907-85C794F793BA}</a:tableStyleId>
               </a:tblPr>
               <a:tblGrid>
-                <a:gridCol w="2456119">
+                <a:gridCol w="2275367">
                   <a:extLst>
                     <a:ext uri="{9D8B030D-6E8A-4147-A177-3AD203B41FA5}">
                       <a16:colId xmlns:a16="http://schemas.microsoft.com/office/drawing/2014/main" val="2388190118"/>
                     </a:ext>
                   </a:extLst>
                 </a:gridCol>
-                <a:gridCol w="2732568">
+                <a:gridCol w="2381693">
                   <a:extLst>
                     <a:ext uri="{9D8B030D-6E8A-4147-A177-3AD203B41FA5}">
                       <a16:colId xmlns:a16="http://schemas.microsoft.com/office/drawing/2014/main" val="1452290489"/>
                     </a:ext>
                   </a:extLst>
                 </a:gridCol>
-                <a:gridCol w="2863928">
+                <a:gridCol w="2615610">
                   <a:extLst>
                     <a:ext uri="{9D8B030D-6E8A-4147-A177-3AD203B41FA5}">
                       <a16:colId xmlns:a16="http://schemas.microsoft.com/office/drawing/2014/main" val="3406886197"/>
@@ -12069,12 +12766,12 @@
                     <a:p>
                       <a:pPr algn="ctr" rtl="0"/>
                       <a:r>
-                        <a:rPr lang="pt-BR" sz="1400" b="0" u="none" strike="noStrike" cap="none" dirty="0">
+                        <a:rPr lang="pt-BR" sz="1400" b="1" u="none" strike="noStrike" cap="none" dirty="0">
                           <a:sym typeface="Arial"/>
                         </a:rPr>
                         <a:t>1º Pacote - Pequeno</a:t>
                       </a:r>
-                      <a:endParaRPr lang="pt-BR" sz="1400" b="0" i="0" u="none" strike="noStrike" cap="none" dirty="0">
+                      <a:endParaRPr lang="pt-BR" sz="1400" b="1" i="0" u="none" strike="noStrike" cap="none" dirty="0">
                         <a:solidFill>
                           <a:schemeClr val="tx1"/>
                         </a:solidFill>
@@ -12108,12 +12805,12 @@
                         <a:buChar char="•"/>
                       </a:pPr>
                       <a:r>
-                        <a:rPr lang="pt-BR" sz="1400" b="0" u="none" strike="noStrike" cap="none" dirty="0">
+                        <a:rPr lang="pt-BR" sz="1400" b="1" u="none" strike="noStrike" cap="none" dirty="0">
                           <a:sym typeface="Arial"/>
                         </a:rPr>
                         <a:t>2º Pacote - Médio</a:t>
                       </a:r>
-                      <a:endParaRPr lang="pt-BR" sz="1400" b="0" i="0" u="none" strike="noStrike" cap="none" dirty="0">
+                      <a:endParaRPr lang="pt-BR" sz="1400" b="1" i="0" u="none" strike="noStrike" cap="none" dirty="0">
                         <a:solidFill>
                           <a:schemeClr val="tx1"/>
                         </a:solidFill>
@@ -12148,12 +12845,12 @@
                         <a:buChar char="•"/>
                       </a:pPr>
                       <a:r>
-                        <a:rPr lang="pt-BR" sz="1400" b="0" u="none" strike="noStrike" cap="none" dirty="0">
+                        <a:rPr lang="pt-BR" sz="1400" b="1" u="none" strike="noStrike" cap="none" dirty="0">
                           <a:sym typeface="Arial"/>
                         </a:rPr>
                         <a:t>3º Pacote - Grande</a:t>
                       </a:r>
-                      <a:endParaRPr lang="pt-BR" sz="1400" b="0" i="0" u="none" strike="noStrike" cap="none" dirty="0">
+                      <a:endParaRPr lang="pt-BR" sz="1400" b="1" i="0" u="none" strike="noStrike" cap="none" dirty="0">
                         <a:solidFill>
                           <a:schemeClr val="tx1"/>
                         </a:solidFill>
@@ -12226,7 +12923,15 @@
                       </a:endParaRPr>
                     </a:p>
                   </a:txBody>
-                  <a:tcPr/>
+                  <a:tcPr>
+                    <a:solidFill>
+                      <a:schemeClr val="accent5">
+                        <a:lumMod val="20000"/>
+                        <a:lumOff val="80000"/>
+                        <a:alpha val="40000"/>
+                      </a:schemeClr>
+                    </a:solidFill>
+                  </a:tcPr>
                 </a:tc>
                 <a:tc>
                   <a:txBody>
@@ -12368,7 +13073,15 @@
                       </a:endParaRPr>
                     </a:p>
                   </a:txBody>
-                  <a:tcPr/>
+                  <a:tcPr>
+                    <a:solidFill>
+                      <a:schemeClr val="accent5">
+                        <a:lumMod val="20000"/>
+                        <a:lumOff val="80000"/>
+                        <a:alpha val="40000"/>
+                      </a:schemeClr>
+                    </a:solidFill>
+                  </a:tcPr>
                 </a:tc>
                 <a:tc>
                   <a:txBody>
@@ -12513,7 +13226,15 @@
                       </a:endParaRPr>
                     </a:p>
                   </a:txBody>
-                  <a:tcPr/>
+                  <a:tcPr>
+                    <a:solidFill>
+                      <a:schemeClr val="accent5">
+                        <a:lumMod val="20000"/>
+                        <a:lumOff val="80000"/>
+                        <a:alpha val="40000"/>
+                      </a:schemeClr>
+                    </a:solidFill>
+                  </a:tcPr>
                 </a:tc>
                 <a:extLst>
                   <a:ext uri="{0D108BD9-81ED-4DB2-BD59-A6C34878D82A}">
@@ -12690,7 +13411,7 @@
 </p:sld>
 </file>
 
-<file path=ppt/slides/slide13.xml><?xml version="1.0" encoding="utf-8"?>
+<file path=ppt/slides/slide15.xml><?xml version="1.0" encoding="utf-8"?>
 <p:sld xmlns:a="http://schemas.openxmlformats.org/drawingml/2006/main" xmlns:r="http://schemas.openxmlformats.org/officeDocument/2006/relationships" xmlns:p="http://schemas.openxmlformats.org/presentationml/2006/main">
   <p:cSld>
     <p:bg>
@@ -12807,7 +13528,7 @@
 </p:sld>
 </file>
 
-<file path=ppt/slides/slide14.xml><?xml version="1.0" encoding="utf-8"?>
+<file path=ppt/slides/slide16.xml><?xml version="1.0" encoding="utf-8"?>
 <p:sld xmlns:a="http://schemas.openxmlformats.org/drawingml/2006/main" xmlns:r="http://schemas.openxmlformats.org/officeDocument/2006/relationships" xmlns:p="http://schemas.openxmlformats.org/presentationml/2006/main">
   <p:cSld>
     <p:bg>
@@ -12932,7 +13653,7 @@
 </p:sld>
 </file>
 
-<file path=ppt/slides/slide15.xml><?xml version="1.0" encoding="utf-8"?>
+<file path=ppt/slides/slide17.xml><?xml version="1.0" encoding="utf-8"?>
 <p:sld xmlns:a="http://schemas.openxmlformats.org/drawingml/2006/main" xmlns:r="http://schemas.openxmlformats.org/officeDocument/2006/relationships" xmlns:p="http://schemas.openxmlformats.org/presentationml/2006/main">
   <p:cSld>
     <p:bg>
@@ -13032,6 +13753,145 @@
     <p:extLst>
       <p:ext uri="{BB962C8B-B14F-4D97-AF65-F5344CB8AC3E}">
         <p14:creationId xmlns:p14="http://schemas.microsoft.com/office/powerpoint/2010/main" val="1983626013"/>
+      </p:ext>
+    </p:extLst>
+  </p:cSld>
+  <p:clrMapOvr>
+    <a:masterClrMapping/>
+  </p:clrMapOvr>
+</p:sld>
+</file>
+
+<file path=ppt/slides/slide18.xml><?xml version="1.0" encoding="utf-8"?>
+<p:sld xmlns:a="http://schemas.openxmlformats.org/drawingml/2006/main" xmlns:r="http://schemas.openxmlformats.org/officeDocument/2006/relationships" xmlns:p="http://schemas.openxmlformats.org/presentationml/2006/main">
+  <p:cSld>
+    <p:bg>
+      <p:bgPr>
+        <a:gradFill>
+          <a:gsLst>
+            <a:gs pos="0">
+              <a:srgbClr val="514A9D"/>
+            </a:gs>
+            <a:gs pos="100000">
+              <a:srgbClr val="4BBDD8"/>
+            </a:gs>
+          </a:gsLst>
+          <a:lin ang="0" scaled="0"/>
+        </a:gradFill>
+        <a:effectLst/>
+      </p:bgPr>
+    </p:bg>
+    <p:spTree>
+      <p:nvGrpSpPr>
+        <p:cNvPr id="1" name="Shape 262"/>
+        <p:cNvGrpSpPr/>
+        <p:nvPr/>
+      </p:nvGrpSpPr>
+      <p:grpSpPr>
+        <a:xfrm>
+          <a:off x="0" y="0"/>
+          <a:ext cx="0" cy="0"/>
+          <a:chOff x="0" y="0"/>
+          <a:chExt cx="0" cy="0"/>
+        </a:xfrm>
+      </p:grpSpPr>
+      <p:sp>
+        <p:nvSpPr>
+          <p:cNvPr id="263" name="Google Shape;263;p26"/>
+          <p:cNvSpPr txBox="1">
+            <a:spLocks noGrp="1"/>
+          </p:cNvSpPr>
+          <p:nvPr>
+            <p:ph type="title"/>
+          </p:nvPr>
+        </p:nvSpPr>
+        <p:spPr>
+          <a:xfrm>
+            <a:off x="259225" y="0"/>
+            <a:ext cx="6067147" cy="1363074"/>
+          </a:xfrm>
+          <a:prstGeom prst="rect">
+            <a:avLst/>
+          </a:prstGeom>
+        </p:spPr>
+        <p:txBody>
+          <a:bodyPr spcFirstLastPara="1" wrap="square" lIns="0" tIns="0" rIns="0" bIns="0" anchor="ctr" anchorCtr="0">
+            <a:noAutofit/>
+          </a:bodyPr>
+          <a:lstStyle/>
+          <a:p>
+            <a:pPr lvl="0"/>
+            <a:r>
+              <a:rPr lang="pt-BR" dirty="0"/>
+              <a:t>Planilha de backlog – 2º Sprint</a:t>
+            </a:r>
+          </a:p>
+        </p:txBody>
+      </p:sp>
+      <p:pic>
+        <p:nvPicPr>
+          <p:cNvPr id="6" name="Imagem 5">
+            <a:extLst>
+              <a:ext uri="{FF2B5EF4-FFF2-40B4-BE49-F238E27FC236}">
+                <a16:creationId xmlns:a16="http://schemas.microsoft.com/office/drawing/2014/main" id="{3CD8B38D-7204-4413-9DB8-9C9E9AE43ED8}"/>
+              </a:ext>
+            </a:extLst>
+          </p:cNvPr>
+          <p:cNvPicPr>
+            <a:picLocks noChangeAspect="1"/>
+          </p:cNvPicPr>
+          <p:nvPr/>
+        </p:nvPicPr>
+        <p:blipFill>
+          <a:blip r:embed="rId3"/>
+          <a:stretch>
+            <a:fillRect/>
+          </a:stretch>
+        </p:blipFill>
+        <p:spPr>
+          <a:xfrm>
+            <a:off x="8559209" y="4561643"/>
+            <a:ext cx="444093" cy="444093"/>
+          </a:xfrm>
+          <a:prstGeom prst="rect">
+            <a:avLst/>
+          </a:prstGeom>
+        </p:spPr>
+      </p:pic>
+      <p:pic>
+        <p:nvPicPr>
+          <p:cNvPr id="2" name="Imagem 1">
+            <a:extLst>
+              <a:ext uri="{FF2B5EF4-FFF2-40B4-BE49-F238E27FC236}">
+                <a16:creationId xmlns:a16="http://schemas.microsoft.com/office/drawing/2014/main" id="{A6E71850-3168-46B2-93D3-3B5255295575}"/>
+              </a:ext>
+            </a:extLst>
+          </p:cNvPr>
+          <p:cNvPicPr>
+            <a:picLocks noChangeAspect="1"/>
+          </p:cNvPicPr>
+          <p:nvPr/>
+        </p:nvPicPr>
+        <p:blipFill>
+          <a:blip r:embed="rId4"/>
+          <a:stretch>
+            <a:fillRect/>
+          </a:stretch>
+        </p:blipFill>
+        <p:spPr>
+          <a:xfrm>
+            <a:off x="199961" y="1584251"/>
+            <a:ext cx="8744077" cy="2977392"/>
+          </a:xfrm>
+          <a:prstGeom prst="rect">
+            <a:avLst/>
+          </a:prstGeom>
+        </p:spPr>
+      </p:pic>
+    </p:spTree>
+    <p:extLst>
+      <p:ext uri="{BB962C8B-B14F-4D97-AF65-F5344CB8AC3E}">
+        <p14:creationId xmlns:p14="http://schemas.microsoft.com/office/powerpoint/2010/main" val="2575390757"/>
       </p:ext>
     </p:extLst>
   </p:cSld>
@@ -13637,7 +14497,7 @@
         <p:spPr>
           <a:xfrm>
             <a:off x="355299" y="2110868"/>
-            <a:ext cx="4807047" cy="1009017"/>
+            <a:ext cx="5446281" cy="1504510"/>
           </a:xfrm>
           <a:prstGeom prst="rect">
             <a:avLst/>
@@ -13659,7 +14519,25 @@
                 </a:solidFill>
                 <a:latin typeface="Roboto Slab"/>
               </a:rPr>
-              <a:t>O Smart Parking é uma ferramenta inteligente de monitoramento e gestão para estacionamentos. </a:t>
+              <a:t>O SMCV (Sistema de Monitoramento para Controle de Vagas) é uma ferramenta inteligente criada pela </a:t>
+            </a:r>
+            <a:r>
+              <a:rPr lang="pt-BR" sz="2000" b="1" dirty="0" err="1">
+                <a:solidFill>
+                  <a:srgbClr val="FFFFFF"/>
+                </a:solidFill>
+                <a:latin typeface="Roboto Slab"/>
+              </a:rPr>
+              <a:t>Smart</a:t>
+            </a:r>
+            <a:r>
+              <a:rPr lang="pt-BR" sz="2000" b="1" dirty="0">
+                <a:solidFill>
+                  <a:srgbClr val="FFFFFF"/>
+                </a:solidFill>
+                <a:latin typeface="Roboto Slab"/>
+              </a:rPr>
+              <a:t> Parking.</a:t>
             </a:r>
           </a:p>
         </p:txBody>
@@ -13773,48 +14651,6 @@
       </p:grpSpPr>
       <p:sp>
         <p:nvSpPr>
-          <p:cNvPr id="180" name="Google Shape;180;p19"/>
-          <p:cNvSpPr txBox="1">
-            <a:spLocks noGrp="1"/>
-          </p:cNvSpPr>
-          <p:nvPr>
-            <p:ph type="ctrTitle" idx="4294967295"/>
-          </p:nvPr>
-        </p:nvSpPr>
-        <p:spPr>
-          <a:xfrm>
-            <a:off x="740725" y="756428"/>
-            <a:ext cx="3287232" cy="784800"/>
-          </a:xfrm>
-          <a:prstGeom prst="rect">
-            <a:avLst/>
-          </a:prstGeom>
-        </p:spPr>
-        <p:txBody>
-          <a:bodyPr spcFirstLastPara="1" wrap="square" lIns="0" tIns="0" rIns="0" bIns="0" anchor="ctr" anchorCtr="0">
-            <a:noAutofit/>
-          </a:bodyPr>
-          <a:lstStyle/>
-          <a:p>
-            <a:pPr marL="0" lvl="0" indent="0" algn="l" rtl="0">
-              <a:spcBef>
-                <a:spcPts val="0"/>
-              </a:spcBef>
-              <a:spcAft>
-                <a:spcPts val="0"/>
-              </a:spcAft>
-              <a:buNone/>
-            </a:pPr>
-            <a:r>
-              <a:rPr lang="pt-BR" sz="3000" dirty="0"/>
-              <a:t>Nosso serviço:</a:t>
-            </a:r>
-            <a:endParaRPr sz="3000" dirty="0"/>
-          </a:p>
-        </p:txBody>
-      </p:sp>
-      <p:sp>
-        <p:nvSpPr>
           <p:cNvPr id="181" name="Google Shape;181;p19"/>
           <p:cNvSpPr txBox="1">
             <a:spLocks noGrp="1"/>
@@ -13825,7 +14661,7 @@
         </p:nvSpPr>
         <p:spPr>
           <a:xfrm>
-            <a:off x="3689958" y="2116668"/>
+            <a:off x="3487940" y="1712631"/>
             <a:ext cx="4807047" cy="1210797"/>
           </a:xfrm>
           <a:prstGeom prst="rect">
@@ -13964,48 +14800,6 @@
       </p:grpSpPr>
       <p:sp>
         <p:nvSpPr>
-          <p:cNvPr id="180" name="Google Shape;180;p19"/>
-          <p:cNvSpPr txBox="1">
-            <a:spLocks noGrp="1"/>
-          </p:cNvSpPr>
-          <p:nvPr>
-            <p:ph type="ctrTitle" idx="4294967295"/>
-          </p:nvPr>
-        </p:nvSpPr>
-        <p:spPr>
-          <a:xfrm>
-            <a:off x="740725" y="756428"/>
-            <a:ext cx="3287232" cy="784800"/>
-          </a:xfrm>
-          <a:prstGeom prst="rect">
-            <a:avLst/>
-          </a:prstGeom>
-        </p:spPr>
-        <p:txBody>
-          <a:bodyPr spcFirstLastPara="1" wrap="square" lIns="0" tIns="0" rIns="0" bIns="0" anchor="ctr" anchorCtr="0">
-            <a:noAutofit/>
-          </a:bodyPr>
-          <a:lstStyle/>
-          <a:p>
-            <a:pPr marL="0" lvl="0" indent="0" algn="l" rtl="0">
-              <a:spcBef>
-                <a:spcPts val="0"/>
-              </a:spcBef>
-              <a:spcAft>
-                <a:spcPts val="0"/>
-              </a:spcAft>
-              <a:buNone/>
-            </a:pPr>
-            <a:r>
-              <a:rPr lang="pt-BR" sz="3000" dirty="0"/>
-              <a:t>Nosso serviço:</a:t>
-            </a:r>
-            <a:endParaRPr sz="3000" dirty="0"/>
-          </a:p>
-        </p:txBody>
-      </p:sp>
-      <p:sp>
-        <p:nvSpPr>
           <p:cNvPr id="181" name="Google Shape;181;p19"/>
           <p:cNvSpPr txBox="1">
             <a:spLocks noGrp="1"/>
@@ -14016,7 +14810,7 @@
         </p:nvSpPr>
         <p:spPr>
           <a:xfrm>
-            <a:off x="355299" y="2110868"/>
+            <a:off x="323402" y="1960199"/>
             <a:ext cx="4807047" cy="2000004"/>
           </a:xfrm>
           <a:prstGeom prst="rect">
@@ -14058,7 +14852,7 @@
         </p:nvGrpSpPr>
         <p:grpSpPr>
           <a:xfrm>
-            <a:off x="6191443" y="1960199"/>
+            <a:off x="6308401" y="1439204"/>
             <a:ext cx="1805444" cy="1812317"/>
             <a:chOff x="3292425" y="3657237"/>
             <a:chExt cx="397025" cy="398538"/>
@@ -14700,6 +15494,728 @@
   <p:cSld>
     <p:bg>
       <p:bgPr>
+        <a:gradFill flip="none" rotWithShape="1">
+          <a:gsLst>
+            <a:gs pos="0">
+              <a:srgbClr val="514A9D"/>
+            </a:gs>
+            <a:gs pos="100000">
+              <a:srgbClr val="4BBDD8"/>
+            </a:gs>
+          </a:gsLst>
+          <a:lin ang="2700000" scaled="1"/>
+          <a:tileRect/>
+        </a:gradFill>
+        <a:effectLst/>
+      </p:bgPr>
+    </p:bg>
+    <p:spTree>
+      <p:nvGrpSpPr>
+        <p:cNvPr id="1" name="Shape 179"/>
+        <p:cNvGrpSpPr/>
+        <p:nvPr/>
+      </p:nvGrpSpPr>
+      <p:grpSpPr>
+        <a:xfrm>
+          <a:off x="0" y="0"/>
+          <a:ext cx="0" cy="0"/>
+          <a:chOff x="0" y="0"/>
+          <a:chExt cx="0" cy="0"/>
+        </a:xfrm>
+      </p:grpSpPr>
+      <p:sp>
+        <p:nvSpPr>
+          <p:cNvPr id="181" name="Google Shape;181;p19"/>
+          <p:cNvSpPr txBox="1">
+            <a:spLocks noGrp="1"/>
+          </p:cNvSpPr>
+          <p:nvPr>
+            <p:ph type="subTitle" idx="4294967295"/>
+          </p:nvPr>
+        </p:nvSpPr>
+        <p:spPr>
+          <a:xfrm>
+            <a:off x="323402" y="1960199"/>
+            <a:ext cx="4807047" cy="2000004"/>
+          </a:xfrm>
+          <a:prstGeom prst="rect">
+            <a:avLst/>
+          </a:prstGeom>
+        </p:spPr>
+        <p:txBody>
+          <a:bodyPr spcFirstLastPara="1" wrap="square" lIns="0" tIns="0" rIns="0" bIns="0" anchor="t" anchorCtr="0">
+            <a:noAutofit/>
+          </a:bodyPr>
+          <a:lstStyle/>
+          <a:p>
+            <a:pPr marL="0" lvl="0" indent="0">
+              <a:buNone/>
+            </a:pPr>
+            <a:endParaRPr lang="pt-BR" sz="2000" b="1" dirty="0">
+              <a:solidFill>
+                <a:srgbClr val="FFFFFF"/>
+              </a:solidFill>
+              <a:latin typeface="Roboto Slab"/>
+            </a:endParaRPr>
+          </a:p>
+        </p:txBody>
+      </p:sp>
+      <p:grpSp>
+        <p:nvGrpSpPr>
+          <p:cNvPr id="9" name="Google Shape;1230;p40">
+            <a:extLst>
+              <a:ext uri="{FF2B5EF4-FFF2-40B4-BE49-F238E27FC236}">
+                <a16:creationId xmlns:a16="http://schemas.microsoft.com/office/drawing/2014/main" id="{A16F7F01-49F2-4C92-A4DF-C751BBF618BC}"/>
+              </a:ext>
+            </a:extLst>
+          </p:cNvPr>
+          <p:cNvGrpSpPr/>
+          <p:nvPr/>
+        </p:nvGrpSpPr>
+        <p:grpSpPr>
+          <a:xfrm>
+            <a:off x="6308401" y="1439204"/>
+            <a:ext cx="1805444" cy="1812317"/>
+            <a:chOff x="3292425" y="3657237"/>
+            <a:chExt cx="397025" cy="398538"/>
+          </a:xfrm>
+        </p:grpSpPr>
+        <p:sp>
+          <p:nvSpPr>
+            <p:cNvPr id="10" name="Google Shape;1231;p40">
+              <a:extLst>
+                <a:ext uri="{FF2B5EF4-FFF2-40B4-BE49-F238E27FC236}">
+                  <a16:creationId xmlns:a16="http://schemas.microsoft.com/office/drawing/2014/main" id="{BC56AF41-4988-4B25-A639-4C8B039C3BAD}"/>
+                </a:ext>
+              </a:extLst>
+            </p:cNvPr>
+            <p:cNvSpPr/>
+            <p:nvPr/>
+          </p:nvSpPr>
+          <p:spPr>
+            <a:xfrm>
+              <a:off x="3292425" y="3680675"/>
+              <a:ext cx="375100" cy="375100"/>
+            </a:xfrm>
+            <a:custGeom>
+              <a:avLst/>
+              <a:gdLst/>
+              <a:ahLst/>
+              <a:cxnLst/>
+              <a:rect l="l" t="t" r="r" b="b"/>
+              <a:pathLst>
+                <a:path w="15004" h="15004" fill="none" extrusionOk="0">
+                  <a:moveTo>
+                    <a:pt x="7502" y="1"/>
+                  </a:moveTo>
+                  <a:lnTo>
+                    <a:pt x="7502" y="1"/>
+                  </a:lnTo>
+                  <a:lnTo>
+                    <a:pt x="7112" y="1"/>
+                  </a:lnTo>
+                  <a:lnTo>
+                    <a:pt x="6747" y="50"/>
+                  </a:lnTo>
+                  <a:lnTo>
+                    <a:pt x="6357" y="98"/>
+                  </a:lnTo>
+                  <a:lnTo>
+                    <a:pt x="5992" y="147"/>
+                  </a:lnTo>
+                  <a:lnTo>
+                    <a:pt x="5627" y="244"/>
+                  </a:lnTo>
+                  <a:lnTo>
+                    <a:pt x="5261" y="342"/>
+                  </a:lnTo>
+                  <a:lnTo>
+                    <a:pt x="4921" y="464"/>
+                  </a:lnTo>
+                  <a:lnTo>
+                    <a:pt x="4580" y="585"/>
+                  </a:lnTo>
+                  <a:lnTo>
+                    <a:pt x="4239" y="732"/>
+                  </a:lnTo>
+                  <a:lnTo>
+                    <a:pt x="3922" y="902"/>
+                  </a:lnTo>
+                  <a:lnTo>
+                    <a:pt x="3605" y="1097"/>
+                  </a:lnTo>
+                  <a:lnTo>
+                    <a:pt x="3313" y="1292"/>
+                  </a:lnTo>
+                  <a:lnTo>
+                    <a:pt x="3021" y="1487"/>
+                  </a:lnTo>
+                  <a:lnTo>
+                    <a:pt x="2729" y="1706"/>
+                  </a:lnTo>
+                  <a:lnTo>
+                    <a:pt x="2461" y="1949"/>
+                  </a:lnTo>
+                  <a:lnTo>
+                    <a:pt x="2193" y="2193"/>
+                  </a:lnTo>
+                  <a:lnTo>
+                    <a:pt x="1949" y="2461"/>
+                  </a:lnTo>
+                  <a:lnTo>
+                    <a:pt x="1706" y="2729"/>
+                  </a:lnTo>
+                  <a:lnTo>
+                    <a:pt x="1486" y="3021"/>
+                  </a:lnTo>
+                  <a:lnTo>
+                    <a:pt x="1292" y="3313"/>
+                  </a:lnTo>
+                  <a:lnTo>
+                    <a:pt x="1097" y="3605"/>
+                  </a:lnTo>
+                  <a:lnTo>
+                    <a:pt x="902" y="3922"/>
+                  </a:lnTo>
+                  <a:lnTo>
+                    <a:pt x="731" y="4239"/>
+                  </a:lnTo>
+                  <a:lnTo>
+                    <a:pt x="585" y="4580"/>
+                  </a:lnTo>
+                  <a:lnTo>
+                    <a:pt x="464" y="4921"/>
+                  </a:lnTo>
+                  <a:lnTo>
+                    <a:pt x="342" y="5262"/>
+                  </a:lnTo>
+                  <a:lnTo>
+                    <a:pt x="244" y="5627"/>
+                  </a:lnTo>
+                  <a:lnTo>
+                    <a:pt x="147" y="5992"/>
+                  </a:lnTo>
+                  <a:lnTo>
+                    <a:pt x="98" y="6358"/>
+                  </a:lnTo>
+                  <a:lnTo>
+                    <a:pt x="50" y="6747"/>
+                  </a:lnTo>
+                  <a:lnTo>
+                    <a:pt x="1" y="7113"/>
+                  </a:lnTo>
+                  <a:lnTo>
+                    <a:pt x="1" y="7502"/>
+                  </a:lnTo>
+                  <a:lnTo>
+                    <a:pt x="1" y="7502"/>
+                  </a:lnTo>
+                  <a:lnTo>
+                    <a:pt x="1" y="7892"/>
+                  </a:lnTo>
+                  <a:lnTo>
+                    <a:pt x="50" y="8257"/>
+                  </a:lnTo>
+                  <a:lnTo>
+                    <a:pt x="98" y="8647"/>
+                  </a:lnTo>
+                  <a:lnTo>
+                    <a:pt x="147" y="9012"/>
+                  </a:lnTo>
+                  <a:lnTo>
+                    <a:pt x="244" y="9378"/>
+                  </a:lnTo>
+                  <a:lnTo>
+                    <a:pt x="342" y="9743"/>
+                  </a:lnTo>
+                  <a:lnTo>
+                    <a:pt x="464" y="10084"/>
+                  </a:lnTo>
+                  <a:lnTo>
+                    <a:pt x="585" y="10425"/>
+                  </a:lnTo>
+                  <a:lnTo>
+                    <a:pt x="731" y="10766"/>
+                  </a:lnTo>
+                  <a:lnTo>
+                    <a:pt x="902" y="11082"/>
+                  </a:lnTo>
+                  <a:lnTo>
+                    <a:pt x="1097" y="11399"/>
+                  </a:lnTo>
+                  <a:lnTo>
+                    <a:pt x="1292" y="11691"/>
+                  </a:lnTo>
+                  <a:lnTo>
+                    <a:pt x="1486" y="11984"/>
+                  </a:lnTo>
+                  <a:lnTo>
+                    <a:pt x="1706" y="12276"/>
+                  </a:lnTo>
+                  <a:lnTo>
+                    <a:pt x="1949" y="12544"/>
+                  </a:lnTo>
+                  <a:lnTo>
+                    <a:pt x="2193" y="12812"/>
+                  </a:lnTo>
+                  <a:lnTo>
+                    <a:pt x="2461" y="13055"/>
+                  </a:lnTo>
+                  <a:lnTo>
+                    <a:pt x="2729" y="13299"/>
+                  </a:lnTo>
+                  <a:lnTo>
+                    <a:pt x="3021" y="13518"/>
+                  </a:lnTo>
+                  <a:lnTo>
+                    <a:pt x="3313" y="13713"/>
+                  </a:lnTo>
+                  <a:lnTo>
+                    <a:pt x="3605" y="13908"/>
+                  </a:lnTo>
+                  <a:lnTo>
+                    <a:pt x="3922" y="14102"/>
+                  </a:lnTo>
+                  <a:lnTo>
+                    <a:pt x="4239" y="14273"/>
+                  </a:lnTo>
+                  <a:lnTo>
+                    <a:pt x="4580" y="14419"/>
+                  </a:lnTo>
+                  <a:lnTo>
+                    <a:pt x="4921" y="14541"/>
+                  </a:lnTo>
+                  <a:lnTo>
+                    <a:pt x="5261" y="14663"/>
+                  </a:lnTo>
+                  <a:lnTo>
+                    <a:pt x="5627" y="14760"/>
+                  </a:lnTo>
+                  <a:lnTo>
+                    <a:pt x="5992" y="14857"/>
+                  </a:lnTo>
+                  <a:lnTo>
+                    <a:pt x="6357" y="14906"/>
+                  </a:lnTo>
+                  <a:lnTo>
+                    <a:pt x="6747" y="14955"/>
+                  </a:lnTo>
+                  <a:lnTo>
+                    <a:pt x="7112" y="15004"/>
+                  </a:lnTo>
+                  <a:lnTo>
+                    <a:pt x="7502" y="15004"/>
+                  </a:lnTo>
+                  <a:lnTo>
+                    <a:pt x="7502" y="15004"/>
+                  </a:lnTo>
+                  <a:lnTo>
+                    <a:pt x="7892" y="15004"/>
+                  </a:lnTo>
+                  <a:lnTo>
+                    <a:pt x="8257" y="14955"/>
+                  </a:lnTo>
+                  <a:lnTo>
+                    <a:pt x="8647" y="14906"/>
+                  </a:lnTo>
+                  <a:lnTo>
+                    <a:pt x="9012" y="14857"/>
+                  </a:lnTo>
+                  <a:lnTo>
+                    <a:pt x="9377" y="14760"/>
+                  </a:lnTo>
+                  <a:lnTo>
+                    <a:pt x="9743" y="14663"/>
+                  </a:lnTo>
+                  <a:lnTo>
+                    <a:pt x="10084" y="14541"/>
+                  </a:lnTo>
+                  <a:lnTo>
+                    <a:pt x="10425" y="14419"/>
+                  </a:lnTo>
+                  <a:lnTo>
+                    <a:pt x="10766" y="14273"/>
+                  </a:lnTo>
+                  <a:lnTo>
+                    <a:pt x="11082" y="14102"/>
+                  </a:lnTo>
+                  <a:lnTo>
+                    <a:pt x="11399" y="13908"/>
+                  </a:lnTo>
+                  <a:lnTo>
+                    <a:pt x="11691" y="13713"/>
+                  </a:lnTo>
+                  <a:lnTo>
+                    <a:pt x="11983" y="13518"/>
+                  </a:lnTo>
+                  <a:lnTo>
+                    <a:pt x="12276" y="13299"/>
+                  </a:lnTo>
+                  <a:lnTo>
+                    <a:pt x="12544" y="13055"/>
+                  </a:lnTo>
+                  <a:lnTo>
+                    <a:pt x="12812" y="12812"/>
+                  </a:lnTo>
+                  <a:lnTo>
+                    <a:pt x="13055" y="12544"/>
+                  </a:lnTo>
+                  <a:lnTo>
+                    <a:pt x="13299" y="12276"/>
+                  </a:lnTo>
+                  <a:lnTo>
+                    <a:pt x="13518" y="11984"/>
+                  </a:lnTo>
+                  <a:lnTo>
+                    <a:pt x="13713" y="11691"/>
+                  </a:lnTo>
+                  <a:lnTo>
+                    <a:pt x="13907" y="11399"/>
+                  </a:lnTo>
+                  <a:lnTo>
+                    <a:pt x="14102" y="11082"/>
+                  </a:lnTo>
+                  <a:lnTo>
+                    <a:pt x="14273" y="10766"/>
+                  </a:lnTo>
+                  <a:lnTo>
+                    <a:pt x="14419" y="10425"/>
+                  </a:lnTo>
+                  <a:lnTo>
+                    <a:pt x="14541" y="10084"/>
+                  </a:lnTo>
+                  <a:lnTo>
+                    <a:pt x="14662" y="9743"/>
+                  </a:lnTo>
+                  <a:lnTo>
+                    <a:pt x="14760" y="9378"/>
+                  </a:lnTo>
+                  <a:lnTo>
+                    <a:pt x="14857" y="9012"/>
+                  </a:lnTo>
+                  <a:lnTo>
+                    <a:pt x="14906" y="8647"/>
+                  </a:lnTo>
+                  <a:lnTo>
+                    <a:pt x="14955" y="8257"/>
+                  </a:lnTo>
+                  <a:lnTo>
+                    <a:pt x="15003" y="7892"/>
+                  </a:lnTo>
+                  <a:lnTo>
+                    <a:pt x="15003" y="7502"/>
+                  </a:lnTo>
+                  <a:lnTo>
+                    <a:pt x="7502" y="7502"/>
+                  </a:lnTo>
+                  <a:lnTo>
+                    <a:pt x="7502" y="1"/>
+                  </a:lnTo>
+                  <a:close/>
+                </a:path>
+              </a:pathLst>
+            </a:custGeom>
+            <a:noFill/>
+            <a:ln w="12175" cap="rnd" cmpd="sng">
+              <a:solidFill>
+                <a:srgbClr val="FFFFFF"/>
+              </a:solidFill>
+              <a:prstDash val="solid"/>
+              <a:round/>
+              <a:headEnd type="none" w="sm" len="sm"/>
+              <a:tailEnd type="none" w="sm" len="sm"/>
+            </a:ln>
+          </p:spPr>
+          <p:txBody>
+            <a:bodyPr spcFirstLastPara="1" wrap="square" lIns="91425" tIns="91425" rIns="91425" bIns="91425" anchor="ctr" anchorCtr="0">
+              <a:noAutofit/>
+            </a:bodyPr>
+            <a:lstStyle/>
+            <a:p>
+              <a:pPr marL="0" lvl="0" indent="0" algn="l" rtl="0">
+                <a:spcBef>
+                  <a:spcPts val="0"/>
+                </a:spcBef>
+                <a:spcAft>
+                  <a:spcPts val="0"/>
+                </a:spcAft>
+                <a:buNone/>
+              </a:pPr>
+              <a:endParaRPr/>
+            </a:p>
+          </p:txBody>
+        </p:sp>
+        <p:sp>
+          <p:nvSpPr>
+            <p:cNvPr id="11" name="Google Shape;1232;p40">
+              <a:extLst>
+                <a:ext uri="{FF2B5EF4-FFF2-40B4-BE49-F238E27FC236}">
+                  <a16:creationId xmlns:a16="http://schemas.microsoft.com/office/drawing/2014/main" id="{0E208C6E-1422-4621-BC2F-FC31DFFA1F76}"/>
+                </a:ext>
+              </a:extLst>
+            </p:cNvPr>
+            <p:cNvSpPr/>
+            <p:nvPr/>
+          </p:nvSpPr>
+          <p:spPr>
+            <a:xfrm>
+              <a:off x="3504325" y="3657237"/>
+              <a:ext cx="131525" cy="153450"/>
+            </a:xfrm>
+            <a:custGeom>
+              <a:avLst/>
+              <a:gdLst/>
+              <a:ahLst/>
+              <a:cxnLst/>
+              <a:rect l="l" t="t" r="r" b="b"/>
+              <a:pathLst>
+                <a:path w="5261" h="6138" fill="none" extrusionOk="0">
+                  <a:moveTo>
+                    <a:pt x="0" y="0"/>
+                  </a:moveTo>
+                  <a:lnTo>
+                    <a:pt x="0" y="0"/>
+                  </a:lnTo>
+                  <a:lnTo>
+                    <a:pt x="390" y="25"/>
+                  </a:lnTo>
+                  <a:lnTo>
+                    <a:pt x="780" y="98"/>
+                  </a:lnTo>
+                  <a:lnTo>
+                    <a:pt x="1169" y="171"/>
+                  </a:lnTo>
+                  <a:lnTo>
+                    <a:pt x="1559" y="268"/>
+                  </a:lnTo>
+                  <a:lnTo>
+                    <a:pt x="1924" y="414"/>
+                  </a:lnTo>
+                  <a:lnTo>
+                    <a:pt x="2314" y="560"/>
+                  </a:lnTo>
+                  <a:lnTo>
+                    <a:pt x="2655" y="731"/>
+                  </a:lnTo>
+                  <a:lnTo>
+                    <a:pt x="3020" y="901"/>
+                  </a:lnTo>
+                  <a:lnTo>
+                    <a:pt x="3020" y="901"/>
+                  </a:lnTo>
+                  <a:lnTo>
+                    <a:pt x="3337" y="1121"/>
+                  </a:lnTo>
+                  <a:lnTo>
+                    <a:pt x="3654" y="1340"/>
+                  </a:lnTo>
+                  <a:lnTo>
+                    <a:pt x="3946" y="1559"/>
+                  </a:lnTo>
+                  <a:lnTo>
+                    <a:pt x="4238" y="1803"/>
+                  </a:lnTo>
+                  <a:lnTo>
+                    <a:pt x="4530" y="2070"/>
+                  </a:lnTo>
+                  <a:lnTo>
+                    <a:pt x="4774" y="2363"/>
+                  </a:lnTo>
+                  <a:lnTo>
+                    <a:pt x="5017" y="2655"/>
+                  </a:lnTo>
+                  <a:lnTo>
+                    <a:pt x="5261" y="2972"/>
+                  </a:lnTo>
+                  <a:lnTo>
+                    <a:pt x="0" y="6138"/>
+                  </a:lnTo>
+                  <a:lnTo>
+                    <a:pt x="0" y="0"/>
+                  </a:lnTo>
+                  <a:close/>
+                </a:path>
+              </a:pathLst>
+            </a:custGeom>
+            <a:solidFill>
+              <a:srgbClr val="00CC99"/>
+            </a:solidFill>
+            <a:ln w="12175" cap="rnd" cmpd="sng">
+              <a:solidFill>
+                <a:srgbClr val="FFFFFF"/>
+              </a:solidFill>
+              <a:prstDash val="solid"/>
+              <a:round/>
+              <a:headEnd type="none" w="sm" len="sm"/>
+              <a:tailEnd type="none" w="sm" len="sm"/>
+            </a:ln>
+          </p:spPr>
+          <p:txBody>
+            <a:bodyPr spcFirstLastPara="1" wrap="square" lIns="91425" tIns="91425" rIns="91425" bIns="91425" anchor="ctr" anchorCtr="0">
+              <a:noAutofit/>
+            </a:bodyPr>
+            <a:lstStyle/>
+            <a:p>
+              <a:pPr marL="0" lvl="0" indent="0" algn="l" rtl="0">
+                <a:spcBef>
+                  <a:spcPts val="0"/>
+                </a:spcBef>
+                <a:spcAft>
+                  <a:spcPts val="0"/>
+                </a:spcAft>
+                <a:buNone/>
+              </a:pPr>
+              <a:endParaRPr dirty="0"/>
+            </a:p>
+          </p:txBody>
+        </p:sp>
+        <p:sp>
+          <p:nvSpPr>
+            <p:cNvPr id="12" name="Google Shape;1233;p40">
+              <a:extLst>
+                <a:ext uri="{FF2B5EF4-FFF2-40B4-BE49-F238E27FC236}">
+                  <a16:creationId xmlns:a16="http://schemas.microsoft.com/office/drawing/2014/main" id="{B4541ECE-0C35-4506-A088-563DBACBB063}"/>
+                </a:ext>
+              </a:extLst>
+            </p:cNvPr>
+            <p:cNvSpPr/>
+            <p:nvPr/>
+          </p:nvSpPr>
+          <p:spPr>
+            <a:xfrm>
+              <a:off x="3501875" y="3749500"/>
+              <a:ext cx="187575" cy="96825"/>
+            </a:xfrm>
+            <a:custGeom>
+              <a:avLst/>
+              <a:gdLst/>
+              <a:ahLst/>
+              <a:cxnLst/>
+              <a:rect l="l" t="t" r="r" b="b"/>
+              <a:pathLst>
+                <a:path w="7503" h="3873" fill="none" extrusionOk="0">
+                  <a:moveTo>
+                    <a:pt x="6431" y="0"/>
+                  </a:moveTo>
+                  <a:lnTo>
+                    <a:pt x="1" y="3872"/>
+                  </a:lnTo>
+                  <a:lnTo>
+                    <a:pt x="7502" y="3872"/>
+                  </a:lnTo>
+                  <a:lnTo>
+                    <a:pt x="7502" y="3872"/>
+                  </a:lnTo>
+                  <a:lnTo>
+                    <a:pt x="7478" y="3337"/>
+                  </a:lnTo>
+                  <a:lnTo>
+                    <a:pt x="7429" y="2825"/>
+                  </a:lnTo>
+                  <a:lnTo>
+                    <a:pt x="7332" y="2314"/>
+                  </a:lnTo>
+                  <a:lnTo>
+                    <a:pt x="7210" y="1827"/>
+                  </a:lnTo>
+                  <a:lnTo>
+                    <a:pt x="7064" y="1340"/>
+                  </a:lnTo>
+                  <a:lnTo>
+                    <a:pt x="6893" y="877"/>
+                  </a:lnTo>
+                  <a:lnTo>
+                    <a:pt x="6674" y="438"/>
+                  </a:lnTo>
+                  <a:lnTo>
+                    <a:pt x="6431" y="0"/>
+                  </a:lnTo>
+                  <a:lnTo>
+                    <a:pt x="6431" y="0"/>
+                  </a:lnTo>
+                  <a:close/>
+                </a:path>
+              </a:pathLst>
+            </a:custGeom>
+            <a:noFill/>
+            <a:ln w="12175" cap="rnd" cmpd="sng">
+              <a:solidFill>
+                <a:srgbClr val="FFFFFF"/>
+              </a:solidFill>
+              <a:prstDash val="solid"/>
+              <a:round/>
+              <a:headEnd type="none" w="sm" len="sm"/>
+              <a:tailEnd type="none" w="sm" len="sm"/>
+            </a:ln>
+          </p:spPr>
+          <p:txBody>
+            <a:bodyPr spcFirstLastPara="1" wrap="square" lIns="91425" tIns="91425" rIns="91425" bIns="91425" anchor="ctr" anchorCtr="0">
+              <a:noAutofit/>
+            </a:bodyPr>
+            <a:lstStyle/>
+            <a:p>
+              <a:pPr marL="0" lvl="0" indent="0" algn="l" rtl="0">
+                <a:spcBef>
+                  <a:spcPts val="0"/>
+                </a:spcBef>
+                <a:spcAft>
+                  <a:spcPts val="0"/>
+                </a:spcAft>
+                <a:buNone/>
+              </a:pPr>
+              <a:endParaRPr/>
+            </a:p>
+          </p:txBody>
+        </p:sp>
+      </p:grpSp>
+      <p:pic>
+        <p:nvPicPr>
+          <p:cNvPr id="13" name="Imagem 12">
+            <a:extLst>
+              <a:ext uri="{FF2B5EF4-FFF2-40B4-BE49-F238E27FC236}">
+                <a16:creationId xmlns:a16="http://schemas.microsoft.com/office/drawing/2014/main" id="{5D5FEB6D-B908-4B85-8D38-AE8883F6A9BC}"/>
+              </a:ext>
+            </a:extLst>
+          </p:cNvPr>
+          <p:cNvPicPr>
+            <a:picLocks noChangeAspect="1"/>
+          </p:cNvPicPr>
+          <p:nvPr/>
+        </p:nvPicPr>
+        <p:blipFill>
+          <a:blip r:embed="rId3"/>
+          <a:stretch>
+            <a:fillRect/>
+          </a:stretch>
+        </p:blipFill>
+        <p:spPr>
+          <a:xfrm>
+            <a:off x="8559209" y="4561643"/>
+            <a:ext cx="444093" cy="444093"/>
+          </a:xfrm>
+          <a:prstGeom prst="rect">
+            <a:avLst/>
+          </a:prstGeom>
+        </p:spPr>
+      </p:pic>
+    </p:spTree>
+    <p:extLst>
+      <p:ext uri="{BB962C8B-B14F-4D97-AF65-F5344CB8AC3E}">
+        <p14:creationId xmlns:p14="http://schemas.microsoft.com/office/powerpoint/2010/main" val="13344087"/>
+      </p:ext>
+    </p:extLst>
+  </p:cSld>
+  <p:clrMapOvr>
+    <a:masterClrMapping/>
+  </p:clrMapOvr>
+</p:sld>
+</file>
+
+<file path=ppt/slides/slide7.xml><?xml version="1.0" encoding="utf-8"?>
+<p:sld xmlns:a="http://schemas.openxmlformats.org/drawingml/2006/main" xmlns:r="http://schemas.openxmlformats.org/officeDocument/2006/relationships" xmlns:p="http://schemas.openxmlformats.org/presentationml/2006/main">
+  <p:cSld>
+    <p:bg>
+      <p:bgPr>
         <a:gradFill>
           <a:gsLst>
             <a:gs pos="0">
@@ -14764,7 +16280,7 @@
               <a:t>A </a:t>
             </a:r>
             <a:r>
-              <a:rPr lang="pt-BR" sz="2500" b="1" dirty="0">
+              <a:rPr lang="pt-BR" sz="3600" b="1" dirty="0">
                 <a:latin typeface="Roboto Slab"/>
                 <a:cs typeface="Segoe UI" panose="020B0502040204020203" pitchFamily="34" charset="0"/>
               </a:rPr>
@@ -16230,7 +17746,7 @@
 </p:sld>
 </file>
 
-<file path=ppt/slides/slide7.xml><?xml version="1.0" encoding="utf-8"?>
+<file path=ppt/slides/slide8.xml><?xml version="1.0" encoding="utf-8"?>
 <p:sld xmlns:a="http://schemas.openxmlformats.org/drawingml/2006/main" xmlns:r="http://schemas.openxmlformats.org/officeDocument/2006/relationships" xmlns:p="http://schemas.openxmlformats.org/presentationml/2006/main">
   <p:cSld>
     <p:bg>
@@ -16299,7 +17815,7 @@
               <a:t>A </a:t>
             </a:r>
             <a:r>
-              <a:rPr lang="pt-BR" sz="2400" b="1" dirty="0">
+              <a:rPr lang="pt-BR" sz="3200" b="1" dirty="0">
                 <a:latin typeface="Roboto Slab"/>
                 <a:cs typeface="Segoe UI" panose="020B0502040204020203" pitchFamily="34" charset="0"/>
               </a:rPr>
@@ -16358,7 +17874,7 @@
 </p:sld>
 </file>
 
-<file path=ppt/slides/slide8.xml><?xml version="1.0" encoding="utf-8"?>
+<file path=ppt/slides/slide9.xml><?xml version="1.0" encoding="utf-8"?>
 <p:sld xmlns:a="http://schemas.openxmlformats.org/drawingml/2006/main" xmlns:r="http://schemas.openxmlformats.org/officeDocument/2006/relationships" xmlns:p="http://schemas.openxmlformats.org/presentationml/2006/main">
   <p:cSld>
     <p:bg>
@@ -16473,10 +17989,10 @@
       </p:pic>
       <p:graphicFrame>
         <p:nvGraphicFramePr>
-          <p:cNvPr id="7" name="Gráfico 6">
+          <p:cNvPr id="4" name="Gráfico 3">
             <a:extLst>
               <a:ext uri="{FF2B5EF4-FFF2-40B4-BE49-F238E27FC236}">
-                <a16:creationId xmlns:a16="http://schemas.microsoft.com/office/drawing/2014/main" id="{3B0048D9-63E1-4C7F-B7E5-6207AC45DC7E}"/>
+                <a16:creationId xmlns:a16="http://schemas.microsoft.com/office/drawing/2014/main" id="{450AA8C5-827D-4225-B2D7-B5F3C5B1D738}"/>
               </a:ext>
             </a:extLst>
           </p:cNvPr>
@@ -16484,14 +18000,14 @@
           <p:nvPr>
             <p:extLst>
               <p:ext uri="{D42A27DB-BD31-4B8C-83A1-F6EECF244321}">
-                <p14:modId xmlns:p14="http://schemas.microsoft.com/office/powerpoint/2010/main" val="3398149716"/>
+                <p14:modId xmlns:p14="http://schemas.microsoft.com/office/powerpoint/2010/main" val="1106450779"/>
               </p:ext>
             </p:extLst>
           </p:nvPr>
         </p:nvGraphicFramePr>
         <p:xfrm>
-          <a:off x="3025654" y="2131103"/>
-          <a:ext cx="4621619" cy="2874633"/>
+          <a:off x="2250558" y="2251592"/>
+          <a:ext cx="4642883" cy="2891908"/>
         </p:xfrm>
         <a:graphic>
           <a:graphicData uri="http://schemas.openxmlformats.org/drawingml/2006/chart">
@@ -16503,134 +18019,6 @@
     <p:extLst>
       <p:ext uri="{BB962C8B-B14F-4D97-AF65-F5344CB8AC3E}">
         <p14:creationId xmlns:p14="http://schemas.microsoft.com/office/powerpoint/2010/main" val="546927011"/>
-      </p:ext>
-    </p:extLst>
-  </p:cSld>
-  <p:clrMapOvr>
-    <a:masterClrMapping/>
-  </p:clrMapOvr>
-</p:sld>
-</file>
-
-<file path=ppt/slides/slide9.xml><?xml version="1.0" encoding="utf-8"?>
-<p:sld xmlns:a="http://schemas.openxmlformats.org/drawingml/2006/main" xmlns:r="http://schemas.openxmlformats.org/officeDocument/2006/relationships" xmlns:p="http://schemas.openxmlformats.org/presentationml/2006/main">
-  <p:cSld>
-    <p:bg>
-      <p:bgPr>
-        <a:gradFill>
-          <a:gsLst>
-            <a:gs pos="0">
-              <a:srgbClr val="514A9D"/>
-            </a:gs>
-            <a:gs pos="100000">
-              <a:srgbClr val="4BBDD8"/>
-            </a:gs>
-          </a:gsLst>
-          <a:lin ang="0" scaled="0"/>
-        </a:gradFill>
-        <a:effectLst/>
-      </p:bgPr>
-    </p:bg>
-    <p:spTree>
-      <p:nvGrpSpPr>
-        <p:cNvPr id="1" name="Shape 166"/>
-        <p:cNvGrpSpPr/>
-        <p:nvPr/>
-      </p:nvGrpSpPr>
-      <p:grpSpPr>
-        <a:xfrm>
-          <a:off x="0" y="0"/>
-          <a:ext cx="0" cy="0"/>
-          <a:chOff x="0" y="0"/>
-          <a:chExt cx="0" cy="0"/>
-        </a:xfrm>
-      </p:grpSpPr>
-      <p:sp>
-        <p:nvSpPr>
-          <p:cNvPr id="167" name="Google Shape;167;p17"/>
-          <p:cNvSpPr txBox="1">
-            <a:spLocks noGrp="1"/>
-          </p:cNvSpPr>
-          <p:nvPr>
-            <p:ph type="body" idx="1"/>
-          </p:nvPr>
-        </p:nvSpPr>
-        <p:spPr>
-          <a:xfrm>
-            <a:off x="591661" y="1090671"/>
-            <a:ext cx="7967548" cy="2638549"/>
-          </a:xfrm>
-          <a:prstGeom prst="rect">
-            <a:avLst/>
-          </a:prstGeom>
-        </p:spPr>
-        <p:txBody>
-          <a:bodyPr spcFirstLastPara="1" wrap="square" lIns="0" tIns="0" rIns="0" bIns="0" anchor="t" anchorCtr="0">
-            <a:noAutofit/>
-          </a:bodyPr>
-          <a:lstStyle/>
-          <a:p>
-            <a:pPr marL="0" lvl="0" indent="0" algn="ctr">
-              <a:buNone/>
-            </a:pPr>
-            <a:r>
-              <a:rPr lang="pt-BR" sz="2400" dirty="0">
-                <a:latin typeface="Roboto Slab"/>
-                <a:cs typeface="Segoe UI" panose="020B0502040204020203" pitchFamily="34" charset="0"/>
-              </a:rPr>
-              <a:t>Nossa </a:t>
-            </a:r>
-            <a:r>
-              <a:rPr lang="pt-BR" sz="2400" b="1" dirty="0">
-                <a:latin typeface="Roboto Slab"/>
-                <a:cs typeface="Segoe UI" panose="020B0502040204020203" pitchFamily="34" charset="0"/>
-              </a:rPr>
-              <a:t>solução</a:t>
-            </a:r>
-            <a:r>
-              <a:rPr lang="pt-BR" sz="2400" dirty="0">
-                <a:latin typeface="Roboto Slab"/>
-                <a:cs typeface="Segoe UI" panose="020B0502040204020203" pitchFamily="34" charset="0"/>
-              </a:rPr>
-              <a:t> irá transformar os dados coletados em conforto e agilidade, tanto para quem consome e para quem fornece. Um serviço eficiente garante o melhor feedback dos clientes.</a:t>
-            </a:r>
-          </a:p>
-        </p:txBody>
-      </p:sp>
-      <p:pic>
-        <p:nvPicPr>
-          <p:cNvPr id="16" name="Imagem 15">
-            <a:extLst>
-              <a:ext uri="{FF2B5EF4-FFF2-40B4-BE49-F238E27FC236}">
-                <a16:creationId xmlns:a16="http://schemas.microsoft.com/office/drawing/2014/main" id="{E93810CB-BACE-42DE-B9A9-882176EB8008}"/>
-              </a:ext>
-            </a:extLst>
-          </p:cNvPr>
-          <p:cNvPicPr>
-            <a:picLocks noChangeAspect="1"/>
-          </p:cNvPicPr>
-          <p:nvPr/>
-        </p:nvPicPr>
-        <p:blipFill>
-          <a:blip r:embed="rId3"/>
-          <a:stretch>
-            <a:fillRect/>
-          </a:stretch>
-        </p:blipFill>
-        <p:spPr>
-          <a:xfrm>
-            <a:off x="8559209" y="4561643"/>
-            <a:ext cx="444093" cy="444093"/>
-          </a:xfrm>
-          <a:prstGeom prst="rect">
-            <a:avLst/>
-          </a:prstGeom>
-        </p:spPr>
-      </p:pic>
-    </p:spTree>
-    <p:extLst>
-      <p:ext uri="{BB962C8B-B14F-4D97-AF65-F5344CB8AC3E}">
-        <p14:creationId xmlns:p14="http://schemas.microsoft.com/office/powerpoint/2010/main" val="3282627685"/>
       </p:ext>
     </p:extLst>
   </p:cSld>

</xml_diff>